<commit_message>
Just saving the progress in repositiory. Not completed yet
</commit_message>
<xml_diff>
--- a/GFS.pptx
+++ b/GFS.pptx
@@ -14,6 +14,11 @@
     <p:sldId id="262" r:id="rId8"/>
     <p:sldId id="263" r:id="rId9"/>
     <p:sldId id="264" r:id="rId10"/>
+    <p:sldId id="265" r:id="rId11"/>
+    <p:sldId id="266" r:id="rId12"/>
+    <p:sldId id="267" r:id="rId13"/>
+    <p:sldId id="268" r:id="rId14"/>
+    <p:sldId id="269" r:id="rId15"/>
   </p:sldIdLst>
   <p:sldSz cx="12192000" cy="6858000"/>
   <p:notesSz cx="6858000" cy="9144000"/>
@@ -126,6 +131,11 @@
             <p14:sldId id="262"/>
             <p14:sldId id="263"/>
             <p14:sldId id="264"/>
+            <p14:sldId id="265"/>
+            <p14:sldId id="266"/>
+            <p14:sldId id="267"/>
+            <p14:sldId id="268"/>
+            <p14:sldId id="269"/>
           </p14:sldIdLst>
         </p14:section>
       </p14:sectionLst>
@@ -286,7 +296,7 @@
           <a:p>
             <a:fld id="{BDC0887E-30F6-48B0-B326-7E062E530290}" type="datetimeFigureOut">
               <a:rPr lang="en-IN" smtClean="0"/>
-              <a:t>02-01-2022</a:t>
+              <a:t>04-01-2022</a:t>
             </a:fld>
             <a:endParaRPr lang="en-IN"/>
           </a:p>
@@ -486,7 +496,7 @@
           <a:p>
             <a:fld id="{BDC0887E-30F6-48B0-B326-7E062E530290}" type="datetimeFigureOut">
               <a:rPr lang="en-IN" smtClean="0"/>
-              <a:t>02-01-2022</a:t>
+              <a:t>04-01-2022</a:t>
             </a:fld>
             <a:endParaRPr lang="en-IN"/>
           </a:p>
@@ -696,7 +706,7 @@
           <a:p>
             <a:fld id="{BDC0887E-30F6-48B0-B326-7E062E530290}" type="datetimeFigureOut">
               <a:rPr lang="en-IN" smtClean="0"/>
-              <a:t>02-01-2022</a:t>
+              <a:t>04-01-2022</a:t>
             </a:fld>
             <a:endParaRPr lang="en-IN"/>
           </a:p>
@@ -896,7 +906,7 @@
           <a:p>
             <a:fld id="{BDC0887E-30F6-48B0-B326-7E062E530290}" type="datetimeFigureOut">
               <a:rPr lang="en-IN" smtClean="0"/>
-              <a:t>02-01-2022</a:t>
+              <a:t>04-01-2022</a:t>
             </a:fld>
             <a:endParaRPr lang="en-IN"/>
           </a:p>
@@ -1172,7 +1182,7 @@
           <a:p>
             <a:fld id="{BDC0887E-30F6-48B0-B326-7E062E530290}" type="datetimeFigureOut">
               <a:rPr lang="en-IN" smtClean="0"/>
-              <a:t>02-01-2022</a:t>
+              <a:t>04-01-2022</a:t>
             </a:fld>
             <a:endParaRPr lang="en-IN"/>
           </a:p>
@@ -1440,7 +1450,7 @@
           <a:p>
             <a:fld id="{BDC0887E-30F6-48B0-B326-7E062E530290}" type="datetimeFigureOut">
               <a:rPr lang="en-IN" smtClean="0"/>
-              <a:t>02-01-2022</a:t>
+              <a:t>04-01-2022</a:t>
             </a:fld>
             <a:endParaRPr lang="en-IN"/>
           </a:p>
@@ -1855,7 +1865,7 @@
           <a:p>
             <a:fld id="{BDC0887E-30F6-48B0-B326-7E062E530290}" type="datetimeFigureOut">
               <a:rPr lang="en-IN" smtClean="0"/>
-              <a:t>02-01-2022</a:t>
+              <a:t>04-01-2022</a:t>
             </a:fld>
             <a:endParaRPr lang="en-IN"/>
           </a:p>
@@ -1997,7 +2007,7 @@
           <a:p>
             <a:fld id="{BDC0887E-30F6-48B0-B326-7E062E530290}" type="datetimeFigureOut">
               <a:rPr lang="en-IN" smtClean="0"/>
-              <a:t>02-01-2022</a:t>
+              <a:t>04-01-2022</a:t>
             </a:fld>
             <a:endParaRPr lang="en-IN"/>
           </a:p>
@@ -2110,7 +2120,7 @@
           <a:p>
             <a:fld id="{BDC0887E-30F6-48B0-B326-7E062E530290}" type="datetimeFigureOut">
               <a:rPr lang="en-IN" smtClean="0"/>
-              <a:t>02-01-2022</a:t>
+              <a:t>04-01-2022</a:t>
             </a:fld>
             <a:endParaRPr lang="en-IN"/>
           </a:p>
@@ -2423,7 +2433,7 @@
           <a:p>
             <a:fld id="{BDC0887E-30F6-48B0-B326-7E062E530290}" type="datetimeFigureOut">
               <a:rPr lang="en-IN" smtClean="0"/>
-              <a:t>02-01-2022</a:t>
+              <a:t>04-01-2022</a:t>
             </a:fld>
             <a:endParaRPr lang="en-IN"/>
           </a:p>
@@ -2712,7 +2722,7 @@
           <a:p>
             <a:fld id="{BDC0887E-30F6-48B0-B326-7E062E530290}" type="datetimeFigureOut">
               <a:rPr lang="en-IN" smtClean="0"/>
-              <a:t>02-01-2022</a:t>
+              <a:t>04-01-2022</a:t>
             </a:fld>
             <a:endParaRPr lang="en-IN"/>
           </a:p>
@@ -2955,7 +2965,7 @@
           <a:p>
             <a:fld id="{BDC0887E-30F6-48B0-B326-7E062E530290}" type="datetimeFigureOut">
               <a:rPr lang="en-IN" smtClean="0"/>
-              <a:t>02-01-2022</a:t>
+              <a:t>04-01-2022</a:t>
             </a:fld>
             <a:endParaRPr lang="en-IN"/>
           </a:p>
@@ -4350,6 +4360,2019 @@
 </p:sld>
 </file>
 
+<file path=ppt/slides/slide10.xml><?xml version="1.0" encoding="utf-8"?>
+<p:sld xmlns:a="http://schemas.openxmlformats.org/drawingml/2006/main" xmlns:r="http://schemas.openxmlformats.org/officeDocument/2006/relationships" xmlns:p="http://schemas.openxmlformats.org/presentationml/2006/main">
+  <p:cSld>
+    <p:spTree>
+      <p:nvGrpSpPr>
+        <p:cNvPr id="1" name=""/>
+        <p:cNvGrpSpPr/>
+        <p:nvPr/>
+      </p:nvGrpSpPr>
+      <p:grpSpPr>
+        <a:xfrm>
+          <a:off x="0" y="0"/>
+          <a:ext cx="0" cy="0"/>
+          <a:chOff x="0" y="0"/>
+          <a:chExt cx="0" cy="0"/>
+        </a:xfrm>
+      </p:grpSpPr>
+      <p:sp>
+        <p:nvSpPr>
+          <p:cNvPr id="6" name="Rectangle 5">
+            <a:extLst>
+              <a:ext uri="{FF2B5EF4-FFF2-40B4-BE49-F238E27FC236}">
+                <a16:creationId xmlns:a16="http://schemas.microsoft.com/office/drawing/2014/main" id="{23D9A284-E705-4058-BC97-E411758071E2}"/>
+              </a:ext>
+            </a:extLst>
+          </p:cNvPr>
+          <p:cNvSpPr/>
+          <p:nvPr/>
+        </p:nvSpPr>
+        <p:spPr>
+          <a:xfrm>
+            <a:off x="0" y="0"/>
+            <a:ext cx="12192000" cy="623843"/>
+          </a:xfrm>
+          <a:prstGeom prst="rect">
+            <a:avLst/>
+          </a:prstGeom>
+        </p:spPr>
+        <p:style>
+          <a:lnRef idx="2">
+            <a:schemeClr val="accent1">
+              <a:shade val="50000"/>
+            </a:schemeClr>
+          </a:lnRef>
+          <a:fillRef idx="1">
+            <a:schemeClr val="accent1"/>
+          </a:fillRef>
+          <a:effectRef idx="0">
+            <a:schemeClr val="accent1"/>
+          </a:effectRef>
+          <a:fontRef idx="minor">
+            <a:schemeClr val="lt1"/>
+          </a:fontRef>
+        </p:style>
+        <p:txBody>
+          <a:bodyPr rtlCol="0" anchor="ctr"/>
+          <a:lstStyle/>
+          <a:p>
+            <a:pPr algn="ctr"/>
+            <a:endParaRPr lang="en-IN" b="1" i="0" dirty="0">
+              <a:effectLst/>
+              <a:latin typeface="Nunito Sans" pitchFamily="2" charset="0"/>
+            </a:endParaRPr>
+          </a:p>
+          <a:p>
+            <a:pPr algn="ctr"/>
+            <a:r>
+              <a:rPr lang="en-IN" b="1" i="0" dirty="0">
+                <a:effectLst/>
+                <a:latin typeface="Nunito Sans" pitchFamily="2" charset="0"/>
+              </a:rPr>
+              <a:t>GFS : </a:t>
+            </a:r>
+            <a:r>
+              <a:rPr lang="en-IN" b="1" dirty="0">
+                <a:latin typeface="Nunito Sans" pitchFamily="2" charset="0"/>
+              </a:rPr>
+              <a:t>Master Operation</a:t>
+            </a:r>
+            <a:endParaRPr lang="en-IN" b="1" i="0" dirty="0">
+              <a:effectLst/>
+              <a:latin typeface="Nunito Sans" pitchFamily="2" charset="0"/>
+            </a:endParaRPr>
+          </a:p>
+          <a:p>
+            <a:pPr algn="ctr"/>
+            <a:endParaRPr lang="en-IN" dirty="0"/>
+          </a:p>
+        </p:txBody>
+      </p:sp>
+      <p:sp>
+        <p:nvSpPr>
+          <p:cNvPr id="18" name="Content Placeholder 7">
+            <a:extLst>
+              <a:ext uri="{FF2B5EF4-FFF2-40B4-BE49-F238E27FC236}">
+                <a16:creationId xmlns:a16="http://schemas.microsoft.com/office/drawing/2014/main" id="{B981940F-71DC-4518-BFDC-53966DAF8FF9}"/>
+              </a:ext>
+            </a:extLst>
+          </p:cNvPr>
+          <p:cNvSpPr txBox="1">
+            <a:spLocks/>
+          </p:cNvSpPr>
+          <p:nvPr/>
+        </p:nvSpPr>
+        <p:spPr>
+          <a:xfrm>
+            <a:off x="188985" y="1809757"/>
+            <a:ext cx="11852130" cy="3409943"/>
+          </a:xfrm>
+          <a:prstGeom prst="rect">
+            <a:avLst/>
+          </a:prstGeom>
+        </p:spPr>
+        <p:txBody>
+          <a:bodyPr vert="horz" lIns="91440" tIns="45720" rIns="91440" bIns="45720" rtlCol="0">
+            <a:normAutofit/>
+          </a:bodyPr>
+          <a:lstStyle>
+            <a:lvl1pPr marL="228600" indent="-228600" algn="l" defTabSz="914400" rtl="0" eaLnBrk="1" latinLnBrk="0" hangingPunct="1">
+              <a:lnSpc>
+                <a:spcPct val="90000"/>
+              </a:lnSpc>
+              <a:spcBef>
+                <a:spcPts val="1000"/>
+              </a:spcBef>
+              <a:buFont typeface="Arial" panose="020B0604020202020204" pitchFamily="34" charset="0"/>
+              <a:buChar char="•"/>
+              <a:defRPr sz="2800" kern="1200">
+                <a:solidFill>
+                  <a:schemeClr val="tx1"/>
+                </a:solidFill>
+                <a:latin typeface="+mn-lt"/>
+                <a:ea typeface="+mn-ea"/>
+                <a:cs typeface="+mn-cs"/>
+              </a:defRPr>
+            </a:lvl1pPr>
+            <a:lvl2pPr marL="685800" indent="-228600" algn="l" defTabSz="914400" rtl="0" eaLnBrk="1" latinLnBrk="0" hangingPunct="1">
+              <a:lnSpc>
+                <a:spcPct val="90000"/>
+              </a:lnSpc>
+              <a:spcBef>
+                <a:spcPts val="500"/>
+              </a:spcBef>
+              <a:buFont typeface="Arial" panose="020B0604020202020204" pitchFamily="34" charset="0"/>
+              <a:buChar char="•"/>
+              <a:defRPr sz="2400" kern="1200">
+                <a:solidFill>
+                  <a:schemeClr val="tx1"/>
+                </a:solidFill>
+                <a:latin typeface="+mn-lt"/>
+                <a:ea typeface="+mn-ea"/>
+                <a:cs typeface="+mn-cs"/>
+              </a:defRPr>
+            </a:lvl2pPr>
+            <a:lvl3pPr marL="1143000" indent="-228600" algn="l" defTabSz="914400" rtl="0" eaLnBrk="1" latinLnBrk="0" hangingPunct="1">
+              <a:lnSpc>
+                <a:spcPct val="90000"/>
+              </a:lnSpc>
+              <a:spcBef>
+                <a:spcPts val="500"/>
+              </a:spcBef>
+              <a:buFont typeface="Arial" panose="020B0604020202020204" pitchFamily="34" charset="0"/>
+              <a:buChar char="•"/>
+              <a:defRPr sz="2000" kern="1200">
+                <a:solidFill>
+                  <a:schemeClr val="tx1"/>
+                </a:solidFill>
+                <a:latin typeface="+mn-lt"/>
+                <a:ea typeface="+mn-ea"/>
+                <a:cs typeface="+mn-cs"/>
+              </a:defRPr>
+            </a:lvl3pPr>
+            <a:lvl4pPr marL="1600200" indent="-228600" algn="l" defTabSz="914400" rtl="0" eaLnBrk="1" latinLnBrk="0" hangingPunct="1">
+              <a:lnSpc>
+                <a:spcPct val="90000"/>
+              </a:lnSpc>
+              <a:spcBef>
+                <a:spcPts val="500"/>
+              </a:spcBef>
+              <a:buFont typeface="Arial" panose="020B0604020202020204" pitchFamily="34" charset="0"/>
+              <a:buChar char="•"/>
+              <a:defRPr sz="1800" kern="1200">
+                <a:solidFill>
+                  <a:schemeClr val="tx1"/>
+                </a:solidFill>
+                <a:latin typeface="+mn-lt"/>
+                <a:ea typeface="+mn-ea"/>
+                <a:cs typeface="+mn-cs"/>
+              </a:defRPr>
+            </a:lvl4pPr>
+            <a:lvl5pPr marL="2057400" indent="-228600" algn="l" defTabSz="914400" rtl="0" eaLnBrk="1" latinLnBrk="0" hangingPunct="1">
+              <a:lnSpc>
+                <a:spcPct val="90000"/>
+              </a:lnSpc>
+              <a:spcBef>
+                <a:spcPts val="500"/>
+              </a:spcBef>
+              <a:buFont typeface="Arial" panose="020B0604020202020204" pitchFamily="34" charset="0"/>
+              <a:buChar char="•"/>
+              <a:defRPr sz="1800" kern="1200">
+                <a:solidFill>
+                  <a:schemeClr val="tx1"/>
+                </a:solidFill>
+                <a:latin typeface="+mn-lt"/>
+                <a:ea typeface="+mn-ea"/>
+                <a:cs typeface="+mn-cs"/>
+              </a:defRPr>
+            </a:lvl5pPr>
+            <a:lvl6pPr marL="2514600" indent="-228600" algn="l" defTabSz="914400" rtl="0" eaLnBrk="1" latinLnBrk="0" hangingPunct="1">
+              <a:lnSpc>
+                <a:spcPct val="90000"/>
+              </a:lnSpc>
+              <a:spcBef>
+                <a:spcPts val="500"/>
+              </a:spcBef>
+              <a:buFont typeface="Arial" panose="020B0604020202020204" pitchFamily="34" charset="0"/>
+              <a:buChar char="•"/>
+              <a:defRPr sz="1800" kern="1200">
+                <a:solidFill>
+                  <a:schemeClr val="tx1"/>
+                </a:solidFill>
+                <a:latin typeface="+mn-lt"/>
+                <a:ea typeface="+mn-ea"/>
+                <a:cs typeface="+mn-cs"/>
+              </a:defRPr>
+            </a:lvl6pPr>
+            <a:lvl7pPr marL="2971800" indent="-228600" algn="l" defTabSz="914400" rtl="0" eaLnBrk="1" latinLnBrk="0" hangingPunct="1">
+              <a:lnSpc>
+                <a:spcPct val="90000"/>
+              </a:lnSpc>
+              <a:spcBef>
+                <a:spcPts val="500"/>
+              </a:spcBef>
+              <a:buFont typeface="Arial" panose="020B0604020202020204" pitchFamily="34" charset="0"/>
+              <a:buChar char="•"/>
+              <a:defRPr sz="1800" kern="1200">
+                <a:solidFill>
+                  <a:schemeClr val="tx1"/>
+                </a:solidFill>
+                <a:latin typeface="+mn-lt"/>
+                <a:ea typeface="+mn-ea"/>
+                <a:cs typeface="+mn-cs"/>
+              </a:defRPr>
+            </a:lvl7pPr>
+            <a:lvl8pPr marL="3429000" indent="-228600" algn="l" defTabSz="914400" rtl="0" eaLnBrk="1" latinLnBrk="0" hangingPunct="1">
+              <a:lnSpc>
+                <a:spcPct val="90000"/>
+              </a:lnSpc>
+              <a:spcBef>
+                <a:spcPts val="500"/>
+              </a:spcBef>
+              <a:buFont typeface="Arial" panose="020B0604020202020204" pitchFamily="34" charset="0"/>
+              <a:buChar char="•"/>
+              <a:defRPr sz="1800" kern="1200">
+                <a:solidFill>
+                  <a:schemeClr val="tx1"/>
+                </a:solidFill>
+                <a:latin typeface="+mn-lt"/>
+                <a:ea typeface="+mn-ea"/>
+                <a:cs typeface="+mn-cs"/>
+              </a:defRPr>
+            </a:lvl8pPr>
+            <a:lvl9pPr marL="3886200" indent="-228600" algn="l" defTabSz="914400" rtl="0" eaLnBrk="1" latinLnBrk="0" hangingPunct="1">
+              <a:lnSpc>
+                <a:spcPct val="90000"/>
+              </a:lnSpc>
+              <a:spcBef>
+                <a:spcPts val="500"/>
+              </a:spcBef>
+              <a:buFont typeface="Arial" panose="020B0604020202020204" pitchFamily="34" charset="0"/>
+              <a:buChar char="•"/>
+              <a:defRPr sz="1800" kern="1200">
+                <a:solidFill>
+                  <a:schemeClr val="tx1"/>
+                </a:solidFill>
+                <a:latin typeface="+mn-lt"/>
+                <a:ea typeface="+mn-ea"/>
+                <a:cs typeface="+mn-cs"/>
+              </a:defRPr>
+            </a:lvl9pPr>
+          </a:lstStyle>
+          <a:p>
+            <a:pPr marL="0" indent="0">
+              <a:spcBef>
+                <a:spcPts val="600"/>
+              </a:spcBef>
+              <a:buNone/>
+            </a:pPr>
+            <a:r>
+              <a:rPr lang="en-US" sz="1400" b="1" dirty="0">
+                <a:solidFill>
+                  <a:srgbClr val="3D3D4E"/>
+                </a:solidFill>
+                <a:latin typeface="Century Gothic" panose="020B0502020202020204" pitchFamily="34" charset="0"/>
+              </a:rPr>
+              <a:t>How are chunked prioritized for Replication?</a:t>
+            </a:r>
+          </a:p>
+          <a:p>
+            <a:pPr>
+              <a:spcBef>
+                <a:spcPts val="600"/>
+              </a:spcBef>
+              <a:buFont typeface="Wingdings" panose="05000000000000000000" pitchFamily="2" charset="2"/>
+              <a:buChar char="ü"/>
+            </a:pPr>
+            <a:r>
+              <a:rPr lang="en-US" sz="1000" dirty="0">
+                <a:solidFill>
+                  <a:srgbClr val="3D3D4E"/>
+                </a:solidFill>
+                <a:latin typeface="Century Gothic" panose="020B0502020202020204" pitchFamily="34" charset="0"/>
+              </a:rPr>
+              <a:t>Delta in Replication Factor Expected – Replication factor Actual</a:t>
+            </a:r>
+          </a:p>
+          <a:p>
+            <a:pPr>
+              <a:spcBef>
+                <a:spcPts val="600"/>
+              </a:spcBef>
+              <a:buFont typeface="Wingdings" panose="05000000000000000000" pitchFamily="2" charset="2"/>
+              <a:buChar char="ü"/>
+            </a:pPr>
+            <a:r>
+              <a:rPr lang="en-US" sz="1000" dirty="0">
+                <a:solidFill>
+                  <a:srgbClr val="3D3D4E"/>
+                </a:solidFill>
+                <a:latin typeface="Century Gothic" panose="020B0502020202020204" pitchFamily="34" charset="0"/>
+              </a:rPr>
+              <a:t>Priority always given to Live chunks rather than deleted file ( this situation comes bcz deletion of chunk from ChunkServer not happened immediately )</a:t>
+            </a:r>
+          </a:p>
+          <a:p>
+            <a:pPr marL="0" indent="0">
+              <a:spcBef>
+                <a:spcPts val="600"/>
+              </a:spcBef>
+              <a:buNone/>
+            </a:pPr>
+            <a:r>
+              <a:rPr lang="en-US" sz="1400" b="1" dirty="0">
+                <a:solidFill>
+                  <a:srgbClr val="3D3D4E"/>
+                </a:solidFill>
+                <a:latin typeface="Century Gothic" panose="020B0502020202020204" pitchFamily="34" charset="0"/>
+              </a:rPr>
+              <a:t>Replica rebalancing</a:t>
+            </a:r>
+          </a:p>
+          <a:p>
+            <a:pPr marL="0" indent="0">
+              <a:spcBef>
+                <a:spcPts val="600"/>
+              </a:spcBef>
+              <a:buNone/>
+            </a:pPr>
+            <a:r>
+              <a:rPr lang="en-US" sz="1000" dirty="0">
+                <a:solidFill>
+                  <a:srgbClr val="3D3D4E"/>
+                </a:solidFill>
+                <a:latin typeface="Century Gothic" panose="020B0502020202020204" pitchFamily="34" charset="0"/>
+              </a:rPr>
+              <a:t>Let’s understand the purpose, why and when we need rebalancing?</a:t>
+            </a:r>
+          </a:p>
+          <a:p>
+            <a:pPr marL="0" indent="0">
+              <a:spcBef>
+                <a:spcPts val="600"/>
+              </a:spcBef>
+              <a:buNone/>
+            </a:pPr>
+            <a:r>
+              <a:rPr lang="en-US" sz="1000" dirty="0">
+                <a:latin typeface="Century Gothic" panose="020B0502020202020204" pitchFamily="34" charset="0"/>
+              </a:rPr>
+              <a:t>If replicas are rebalanced across the cluster well than our load balancing will effective work optimally. Another important factor of rebalancing is Disk Usage of ChunkServer.</a:t>
+            </a:r>
+          </a:p>
+          <a:p>
+            <a:pPr marL="0" indent="0">
+              <a:spcBef>
+                <a:spcPts val="600"/>
+              </a:spcBef>
+              <a:buNone/>
+            </a:pPr>
+            <a:r>
+              <a:rPr lang="en-US" sz="1400" b="1" dirty="0">
+                <a:solidFill>
+                  <a:srgbClr val="3D3D4E"/>
+                </a:solidFill>
+                <a:latin typeface="Century Gothic" panose="020B0502020202020204" pitchFamily="34" charset="0"/>
+              </a:rPr>
+              <a:t>Stale Replica detection</a:t>
+            </a:r>
+          </a:p>
+          <a:p>
+            <a:pPr marL="0" indent="0">
+              <a:spcBef>
+                <a:spcPts val="600"/>
+              </a:spcBef>
+              <a:buNone/>
+            </a:pPr>
+            <a:r>
+              <a:rPr lang="en-US" sz="1000" dirty="0">
+                <a:latin typeface="Century Gothic" panose="020B0502020202020204" pitchFamily="34" charset="0"/>
+              </a:rPr>
+              <a:t>For each chunk, the master maintains a chunk Version Number to distinguish between up-to-date and stale replicas. The master increments the chunk version every time it grants a lease (more on this later) and informs all up-to-date replicas. The master and these replicas all record the new version number in their persistent state.</a:t>
+            </a:r>
+          </a:p>
+          <a:p>
+            <a:pPr marL="0" indent="0">
+              <a:spcBef>
+                <a:spcPts val="600"/>
+              </a:spcBef>
+              <a:buNone/>
+            </a:pPr>
+            <a:r>
+              <a:rPr lang="en-US" sz="1000" dirty="0">
+                <a:latin typeface="Century Gothic" panose="020B0502020202020204" pitchFamily="34" charset="0"/>
+              </a:rPr>
+              <a:t>	If the ChunkServer hosting a chunk replica is down during a mutation, the chunk replica will become stale and will have an older version number. </a:t>
+            </a:r>
+          </a:p>
+          <a:p>
+            <a:pPr marL="0" indent="0">
+              <a:spcBef>
+                <a:spcPts val="600"/>
+              </a:spcBef>
+              <a:buNone/>
+            </a:pPr>
+            <a:r>
+              <a:rPr lang="en-US" sz="1000" b="1" dirty="0">
+                <a:latin typeface="Century Gothic" panose="020B0502020202020204" pitchFamily="34" charset="0"/>
+              </a:rPr>
+              <a:t>The master will detect this when the ChunkServer restarts and reports its set of chunks and their associated version numbers.</a:t>
+            </a:r>
+          </a:p>
+          <a:p>
+            <a:pPr marL="0" indent="0">
+              <a:spcBef>
+                <a:spcPts val="600"/>
+              </a:spcBef>
+              <a:buNone/>
+            </a:pPr>
+            <a:r>
+              <a:rPr lang="en-US" sz="1000" dirty="0">
+                <a:solidFill>
+                  <a:srgbClr val="3D3D4E"/>
+                </a:solidFill>
+                <a:latin typeface="Century Gothic" panose="020B0502020202020204" pitchFamily="34" charset="0"/>
+              </a:rPr>
+              <a:t>Master removes stale replicas during regular garbage collection.</a:t>
+            </a:r>
+          </a:p>
+          <a:p>
+            <a:pPr marL="0" indent="0">
+              <a:spcBef>
+                <a:spcPts val="0"/>
+              </a:spcBef>
+              <a:buNone/>
+            </a:pPr>
+            <a:endParaRPr lang="en-US" sz="1000" b="0" i="0" dirty="0">
+              <a:solidFill>
+                <a:srgbClr val="3D3D4E"/>
+              </a:solidFill>
+              <a:effectLst/>
+              <a:latin typeface="Century Gothic" panose="020B0502020202020204" pitchFamily="34" charset="0"/>
+            </a:endParaRPr>
+          </a:p>
+          <a:p>
+            <a:pPr marL="0" indent="0">
+              <a:spcBef>
+                <a:spcPts val="0"/>
+              </a:spcBef>
+              <a:buNone/>
+            </a:pPr>
+            <a:r>
+              <a:rPr lang="en-US" sz="1000" dirty="0">
+                <a:solidFill>
+                  <a:srgbClr val="3D3D4E"/>
+                </a:solidFill>
+                <a:latin typeface="Century Gothic" panose="020B0502020202020204" pitchFamily="34" charset="0"/>
+              </a:rPr>
+              <a:t>There are some situation where your client may have stale data because client caching data for better experience, and that is not because data served to them as stale data. It happens because client himself cache data for better performance.</a:t>
+            </a:r>
+          </a:p>
+          <a:p>
+            <a:pPr marL="0" indent="0">
+              <a:spcBef>
+                <a:spcPts val="0"/>
+              </a:spcBef>
+              <a:buNone/>
+            </a:pPr>
+            <a:endParaRPr lang="en-US" sz="1000" b="0" i="0" dirty="0">
+              <a:solidFill>
+                <a:srgbClr val="3D3D4E"/>
+              </a:solidFill>
+              <a:effectLst/>
+              <a:latin typeface="Century Gothic" panose="020B0502020202020204" pitchFamily="34" charset="0"/>
+            </a:endParaRPr>
+          </a:p>
+          <a:p>
+            <a:pPr marL="0" indent="0">
+              <a:spcBef>
+                <a:spcPts val="0"/>
+              </a:spcBef>
+              <a:buNone/>
+            </a:pPr>
+            <a:r>
+              <a:rPr lang="en-US" sz="1000" b="0" i="0" dirty="0">
+                <a:solidFill>
+                  <a:srgbClr val="3D3D4E"/>
+                </a:solidFill>
+                <a:effectLst/>
+                <a:latin typeface="Century Gothic" panose="020B0502020202020204" pitchFamily="34" charset="0"/>
+              </a:rPr>
+              <a:t>The impact of this is low since most operations to a chunk are append-only. </a:t>
+            </a:r>
+            <a:r>
+              <a:rPr lang="en-US" sz="1000" dirty="0">
+                <a:solidFill>
+                  <a:srgbClr val="3D3D4E"/>
+                </a:solidFill>
+                <a:latin typeface="Century Gothic" panose="020B0502020202020204" pitchFamily="34" charset="0"/>
+              </a:rPr>
+              <a:t>This means that a stale replica usually returns a premature end of a chunk rather than outdated data for a value.</a:t>
+            </a:r>
+            <a:endParaRPr lang="en-IN" sz="1200" b="1" dirty="0">
+              <a:solidFill>
+                <a:srgbClr val="3D3D4E"/>
+              </a:solidFill>
+              <a:latin typeface="Century Gothic" panose="020B0502020202020204" pitchFamily="34" charset="0"/>
+            </a:endParaRPr>
+          </a:p>
+          <a:p>
+            <a:pPr marL="0" indent="0">
+              <a:spcBef>
+                <a:spcPts val="0"/>
+              </a:spcBef>
+              <a:buFont typeface="Arial" panose="020B0604020202020204" pitchFamily="34" charset="0"/>
+              <a:buNone/>
+            </a:pPr>
+            <a:endParaRPr lang="en-IN" sz="1200" dirty="0">
+              <a:solidFill>
+                <a:srgbClr val="3D3D4E"/>
+              </a:solidFill>
+              <a:latin typeface="Century Gothic" panose="020B0502020202020204" pitchFamily="34" charset="0"/>
+            </a:endParaRPr>
+          </a:p>
+          <a:p>
+            <a:pPr marL="0" indent="0">
+              <a:spcBef>
+                <a:spcPts val="0"/>
+              </a:spcBef>
+              <a:buFont typeface="Arial" panose="020B0604020202020204" pitchFamily="34" charset="0"/>
+              <a:buNone/>
+            </a:pPr>
+            <a:endParaRPr lang="en-IN" sz="1200" dirty="0">
+              <a:solidFill>
+                <a:srgbClr val="3D3D4E"/>
+              </a:solidFill>
+              <a:latin typeface="Century Gothic" panose="020B0502020202020204" pitchFamily="34" charset="0"/>
+            </a:endParaRPr>
+          </a:p>
+          <a:p>
+            <a:pPr marL="0" indent="0">
+              <a:buFont typeface="Arial" panose="020B0604020202020204" pitchFamily="34" charset="0"/>
+              <a:buNone/>
+            </a:pPr>
+            <a:endParaRPr lang="en-IN" sz="1200" dirty="0">
+              <a:solidFill>
+                <a:srgbClr val="3D3D4E"/>
+              </a:solidFill>
+              <a:latin typeface="Century Gothic" panose="020B0502020202020204" pitchFamily="34" charset="0"/>
+            </a:endParaRPr>
+          </a:p>
+          <a:p>
+            <a:pPr marL="0" indent="0">
+              <a:buFont typeface="Arial" panose="020B0604020202020204" pitchFamily="34" charset="0"/>
+              <a:buNone/>
+            </a:pPr>
+            <a:endParaRPr lang="en-IN" sz="1200" dirty="0">
+              <a:solidFill>
+                <a:srgbClr val="3D3D4E"/>
+              </a:solidFill>
+              <a:latin typeface="Century Gothic" panose="020B0502020202020204" pitchFamily="34" charset="0"/>
+            </a:endParaRPr>
+          </a:p>
+          <a:p>
+            <a:pPr marL="0" indent="0">
+              <a:buFont typeface="Arial" panose="020B0604020202020204" pitchFamily="34" charset="0"/>
+              <a:buNone/>
+            </a:pPr>
+            <a:endParaRPr lang="en-IN" sz="1200" dirty="0">
+              <a:solidFill>
+                <a:srgbClr val="3D3D4E"/>
+              </a:solidFill>
+              <a:latin typeface="Century Gothic" panose="020B0502020202020204" pitchFamily="34" charset="0"/>
+            </a:endParaRPr>
+          </a:p>
+          <a:p>
+            <a:pPr marL="0" indent="0">
+              <a:buFont typeface="Arial" panose="020B0604020202020204" pitchFamily="34" charset="0"/>
+              <a:buNone/>
+            </a:pPr>
+            <a:endParaRPr lang="en-IN" sz="1200" dirty="0">
+              <a:solidFill>
+                <a:srgbClr val="3D3D4E"/>
+              </a:solidFill>
+              <a:latin typeface="Century Gothic" panose="020B0502020202020204" pitchFamily="34" charset="0"/>
+            </a:endParaRPr>
+          </a:p>
+          <a:p>
+            <a:pPr marL="0" indent="0">
+              <a:buFont typeface="Arial" panose="020B0604020202020204" pitchFamily="34" charset="0"/>
+              <a:buNone/>
+            </a:pPr>
+            <a:endParaRPr lang="en-IN" sz="1200" dirty="0">
+              <a:solidFill>
+                <a:srgbClr val="3D3D4E"/>
+              </a:solidFill>
+              <a:latin typeface="Century Gothic" panose="020B0502020202020204" pitchFamily="34" charset="0"/>
+            </a:endParaRPr>
+          </a:p>
+        </p:txBody>
+      </p:sp>
+      <p:sp>
+        <p:nvSpPr>
+          <p:cNvPr id="8" name="Rectangle 7">
+            <a:extLst>
+              <a:ext uri="{FF2B5EF4-FFF2-40B4-BE49-F238E27FC236}">
+                <a16:creationId xmlns:a16="http://schemas.microsoft.com/office/drawing/2014/main" id="{3E776BD2-F992-4105-B179-A85CE4C534D9}"/>
+              </a:ext>
+            </a:extLst>
+          </p:cNvPr>
+          <p:cNvSpPr/>
+          <p:nvPr/>
+        </p:nvSpPr>
+        <p:spPr>
+          <a:xfrm>
+            <a:off x="169935" y="742956"/>
+            <a:ext cx="11871180" cy="5948407"/>
+          </a:xfrm>
+          <a:prstGeom prst="rect">
+            <a:avLst/>
+          </a:prstGeom>
+          <a:noFill/>
+          <a:ln w="9525" cap="flat" cmpd="sng" algn="ctr">
+            <a:solidFill>
+              <a:schemeClr val="accent3"/>
+            </a:solidFill>
+            <a:prstDash val="solid"/>
+            <a:round/>
+            <a:headEnd type="none" w="med" len="med"/>
+            <a:tailEnd type="none" w="med" len="med"/>
+          </a:ln>
+        </p:spPr>
+        <p:style>
+          <a:lnRef idx="0">
+            <a:scrgbClr r="0" g="0" b="0"/>
+          </a:lnRef>
+          <a:fillRef idx="0">
+            <a:scrgbClr r="0" g="0" b="0"/>
+          </a:fillRef>
+          <a:effectRef idx="0">
+            <a:scrgbClr r="0" g="0" b="0"/>
+          </a:effectRef>
+          <a:fontRef idx="minor">
+            <a:schemeClr val="accent3"/>
+          </a:fontRef>
+        </p:style>
+        <p:txBody>
+          <a:bodyPr rtlCol="0" anchor="ctr"/>
+          <a:lstStyle/>
+          <a:p>
+            <a:pPr algn="ctr"/>
+            <a:endParaRPr lang="en-IN" dirty="0"/>
+          </a:p>
+        </p:txBody>
+      </p:sp>
+    </p:spTree>
+    <p:extLst>
+      <p:ext uri="{BB962C8B-B14F-4D97-AF65-F5344CB8AC3E}">
+        <p14:creationId xmlns:p14="http://schemas.microsoft.com/office/powerpoint/2010/main" val="134427369"/>
+      </p:ext>
+    </p:extLst>
+  </p:cSld>
+  <p:clrMapOvr>
+    <a:masterClrMapping/>
+  </p:clrMapOvr>
+</p:sld>
+</file>
+
+<file path=ppt/slides/slide11.xml><?xml version="1.0" encoding="utf-8"?>
+<p:sld xmlns:a="http://schemas.openxmlformats.org/drawingml/2006/main" xmlns:r="http://schemas.openxmlformats.org/officeDocument/2006/relationships" xmlns:p="http://schemas.openxmlformats.org/presentationml/2006/main">
+  <p:cSld>
+    <p:spTree>
+      <p:nvGrpSpPr>
+        <p:cNvPr id="1" name=""/>
+        <p:cNvGrpSpPr/>
+        <p:nvPr/>
+      </p:nvGrpSpPr>
+      <p:grpSpPr>
+        <a:xfrm>
+          <a:off x="0" y="0"/>
+          <a:ext cx="0" cy="0"/>
+          <a:chOff x="0" y="0"/>
+          <a:chExt cx="0" cy="0"/>
+        </a:xfrm>
+      </p:grpSpPr>
+      <p:sp>
+        <p:nvSpPr>
+          <p:cNvPr id="6" name="Rectangle 5">
+            <a:extLst>
+              <a:ext uri="{FF2B5EF4-FFF2-40B4-BE49-F238E27FC236}">
+                <a16:creationId xmlns:a16="http://schemas.microsoft.com/office/drawing/2014/main" id="{23D9A284-E705-4058-BC97-E411758071E2}"/>
+              </a:ext>
+            </a:extLst>
+          </p:cNvPr>
+          <p:cNvSpPr/>
+          <p:nvPr/>
+        </p:nvSpPr>
+        <p:spPr>
+          <a:xfrm>
+            <a:off x="0" y="0"/>
+            <a:ext cx="12192000" cy="623843"/>
+          </a:xfrm>
+          <a:prstGeom prst="rect">
+            <a:avLst/>
+          </a:prstGeom>
+        </p:spPr>
+        <p:style>
+          <a:lnRef idx="2">
+            <a:schemeClr val="accent1">
+              <a:shade val="50000"/>
+            </a:schemeClr>
+          </a:lnRef>
+          <a:fillRef idx="1">
+            <a:schemeClr val="accent1"/>
+          </a:fillRef>
+          <a:effectRef idx="0">
+            <a:schemeClr val="accent1"/>
+          </a:effectRef>
+          <a:fontRef idx="minor">
+            <a:schemeClr val="lt1"/>
+          </a:fontRef>
+        </p:style>
+        <p:txBody>
+          <a:bodyPr rtlCol="0" anchor="ctr"/>
+          <a:lstStyle/>
+          <a:p>
+            <a:pPr algn="ctr"/>
+            <a:endParaRPr lang="en-IN" b="1" i="0" dirty="0">
+              <a:effectLst/>
+              <a:latin typeface="Nunito Sans" pitchFamily="2" charset="0"/>
+            </a:endParaRPr>
+          </a:p>
+          <a:p>
+            <a:pPr algn="ctr"/>
+            <a:r>
+              <a:rPr lang="en-IN" b="1" i="0" dirty="0">
+                <a:effectLst/>
+                <a:latin typeface="Nunito Sans" pitchFamily="2" charset="0"/>
+              </a:rPr>
+              <a:t>GFS : Client Read Operation</a:t>
+            </a:r>
+          </a:p>
+          <a:p>
+            <a:pPr algn="ctr"/>
+            <a:endParaRPr lang="en-IN" dirty="0"/>
+          </a:p>
+        </p:txBody>
+      </p:sp>
+      <p:sp>
+        <p:nvSpPr>
+          <p:cNvPr id="8" name="Rectangle 7">
+            <a:extLst>
+              <a:ext uri="{FF2B5EF4-FFF2-40B4-BE49-F238E27FC236}">
+                <a16:creationId xmlns:a16="http://schemas.microsoft.com/office/drawing/2014/main" id="{3E776BD2-F992-4105-B179-A85CE4C534D9}"/>
+              </a:ext>
+            </a:extLst>
+          </p:cNvPr>
+          <p:cNvSpPr/>
+          <p:nvPr/>
+        </p:nvSpPr>
+        <p:spPr>
+          <a:xfrm>
+            <a:off x="169935" y="742956"/>
+            <a:ext cx="11871180" cy="5948407"/>
+          </a:xfrm>
+          <a:prstGeom prst="rect">
+            <a:avLst/>
+          </a:prstGeom>
+          <a:noFill/>
+          <a:ln w="9525" cap="flat" cmpd="sng" algn="ctr">
+            <a:solidFill>
+              <a:schemeClr val="accent3"/>
+            </a:solidFill>
+            <a:prstDash val="solid"/>
+            <a:round/>
+            <a:headEnd type="none" w="med" len="med"/>
+            <a:tailEnd type="none" w="med" len="med"/>
+          </a:ln>
+        </p:spPr>
+        <p:style>
+          <a:lnRef idx="0">
+            <a:scrgbClr r="0" g="0" b="0"/>
+          </a:lnRef>
+          <a:fillRef idx="0">
+            <a:scrgbClr r="0" g="0" b="0"/>
+          </a:fillRef>
+          <a:effectRef idx="0">
+            <a:scrgbClr r="0" g="0" b="0"/>
+          </a:effectRef>
+          <a:fontRef idx="minor">
+            <a:schemeClr val="accent3"/>
+          </a:fontRef>
+        </p:style>
+        <p:txBody>
+          <a:bodyPr rtlCol="0" anchor="ctr"/>
+          <a:lstStyle/>
+          <a:p>
+            <a:pPr algn="ctr"/>
+            <a:endParaRPr lang="en-IN" dirty="0"/>
+          </a:p>
+        </p:txBody>
+      </p:sp>
+      <p:pic>
+        <p:nvPicPr>
+          <p:cNvPr id="4" name="Picture 3">
+            <a:extLst>
+              <a:ext uri="{FF2B5EF4-FFF2-40B4-BE49-F238E27FC236}">
+                <a16:creationId xmlns:a16="http://schemas.microsoft.com/office/drawing/2014/main" id="{585F2832-DC8F-44A1-84A8-542E7124CF5A}"/>
+              </a:ext>
+            </a:extLst>
+          </p:cNvPr>
+          <p:cNvPicPr>
+            <a:picLocks noChangeAspect="1"/>
+          </p:cNvPicPr>
+          <p:nvPr/>
+        </p:nvPicPr>
+        <p:blipFill>
+          <a:blip r:embed="rId2"/>
+          <a:stretch>
+            <a:fillRect/>
+          </a:stretch>
+        </p:blipFill>
+        <p:spPr>
+          <a:xfrm>
+            <a:off x="6192059" y="1740549"/>
+            <a:ext cx="5830006" cy="3376901"/>
+          </a:xfrm>
+          <a:prstGeom prst="rect">
+            <a:avLst/>
+          </a:prstGeom>
+        </p:spPr>
+      </p:pic>
+      <p:sp>
+        <p:nvSpPr>
+          <p:cNvPr id="5" name="TextBox 4">
+            <a:extLst>
+              <a:ext uri="{FF2B5EF4-FFF2-40B4-BE49-F238E27FC236}">
+                <a16:creationId xmlns:a16="http://schemas.microsoft.com/office/drawing/2014/main" id="{0BF53E1C-7B85-488B-AA02-6BBA2B450CDF}"/>
+              </a:ext>
+            </a:extLst>
+          </p:cNvPr>
+          <p:cNvSpPr txBox="1"/>
+          <p:nvPr/>
+        </p:nvSpPr>
+        <p:spPr>
+          <a:xfrm>
+            <a:off x="265994" y="1351507"/>
+            <a:ext cx="5830006" cy="4308872"/>
+          </a:xfrm>
+          <a:prstGeom prst="rect">
+            <a:avLst/>
+          </a:prstGeom>
+          <a:noFill/>
+        </p:spPr>
+        <p:txBody>
+          <a:bodyPr wrap="square" rtlCol="0">
+            <a:spAutoFit/>
+          </a:bodyPr>
+          <a:lstStyle/>
+          <a:p>
+            <a:pPr marL="171450" indent="-171450">
+              <a:buFont typeface="Wingdings" panose="05000000000000000000" pitchFamily="2" charset="2"/>
+              <a:buChar char="ü"/>
+            </a:pPr>
+            <a:r>
+              <a:rPr lang="en-IN" sz="1000" dirty="0">
+                <a:latin typeface="Century Gothic" panose="020B0502020202020204" pitchFamily="34" charset="0"/>
+              </a:rPr>
+              <a:t>System or application which is suppose to store the large file into GFS, they will first calculate the chunk index using GFS client agent installed on client device.</a:t>
+            </a:r>
+          </a:p>
+          <a:p>
+            <a:endParaRPr lang="en-IN" sz="1000" dirty="0">
+              <a:latin typeface="Century Gothic" panose="020B0502020202020204" pitchFamily="34" charset="0"/>
+            </a:endParaRPr>
+          </a:p>
+          <a:p>
+            <a:pPr marL="171450" indent="-171450">
+              <a:buFont typeface="Wingdings" panose="05000000000000000000" pitchFamily="2" charset="2"/>
+              <a:buChar char="ü"/>
+            </a:pPr>
+            <a:r>
+              <a:rPr lang="en-IN" sz="1000" dirty="0">
+                <a:latin typeface="Century Gothic" panose="020B0502020202020204" pitchFamily="34" charset="0"/>
+              </a:rPr>
+              <a:t>GFS Client convert byte offset into chunk index, than DFS client call RPC on GFS master server(metadata)</a:t>
+            </a:r>
+          </a:p>
+          <a:p>
+            <a:pPr marL="171450" indent="-171450">
+              <a:buFont typeface="Wingdings" panose="05000000000000000000" pitchFamily="2" charset="2"/>
+              <a:buChar char="ü"/>
+            </a:pPr>
+            <a:endParaRPr lang="en-IN" sz="1000" dirty="0">
+              <a:latin typeface="Century Gothic" panose="020B0502020202020204" pitchFamily="34" charset="0"/>
+            </a:endParaRPr>
+          </a:p>
+          <a:p>
+            <a:pPr marL="171450" indent="-171450">
+              <a:buFont typeface="Wingdings" panose="05000000000000000000" pitchFamily="2" charset="2"/>
+              <a:buChar char="ü"/>
+            </a:pPr>
+            <a:r>
+              <a:rPr lang="en-IN" sz="1000" dirty="0">
+                <a:latin typeface="Century Gothic" panose="020B0502020202020204" pitchFamily="34" charset="0"/>
+              </a:rPr>
+              <a:t>GFS Master Server will return chunk handle, replica locations to GFS client</a:t>
+            </a:r>
+          </a:p>
+          <a:p>
+            <a:pPr marL="171450" indent="-171450">
+              <a:buFont typeface="Wingdings" panose="05000000000000000000" pitchFamily="2" charset="2"/>
+              <a:buChar char="ü"/>
+            </a:pPr>
+            <a:endParaRPr lang="en-IN" sz="1000" dirty="0">
+              <a:latin typeface="Century Gothic" panose="020B0502020202020204" pitchFamily="34" charset="0"/>
+            </a:endParaRPr>
+          </a:p>
+          <a:p>
+            <a:pPr marL="171450" indent="-171450">
+              <a:buFont typeface="Wingdings" panose="05000000000000000000" pitchFamily="2" charset="2"/>
+              <a:buChar char="ü"/>
+            </a:pPr>
+            <a:r>
+              <a:rPr lang="en-IN" sz="1000" dirty="0">
+                <a:latin typeface="Century Gothic" panose="020B0502020202020204" pitchFamily="34" charset="0"/>
+              </a:rPr>
+              <a:t>GFS client will send request for chunk to the ChunkServer which they received from GFS master server</a:t>
+            </a:r>
+          </a:p>
+          <a:p>
+            <a:pPr marL="171450" indent="-171450">
+              <a:buFont typeface="Wingdings" panose="05000000000000000000" pitchFamily="2" charset="2"/>
+              <a:buChar char="ü"/>
+            </a:pPr>
+            <a:endParaRPr lang="en-IN" sz="1000" dirty="0">
+              <a:latin typeface="Century Gothic" panose="020B0502020202020204" pitchFamily="34" charset="0"/>
+            </a:endParaRPr>
+          </a:p>
+          <a:p>
+            <a:pPr marL="171450" indent="-171450">
+              <a:buFont typeface="Wingdings" panose="05000000000000000000" pitchFamily="2" charset="2"/>
+              <a:buChar char="ü"/>
+            </a:pPr>
+            <a:r>
+              <a:rPr lang="en-IN" sz="1000" dirty="0">
+                <a:latin typeface="Century Gothic" panose="020B0502020202020204" pitchFamily="34" charset="0"/>
+              </a:rPr>
+              <a:t>GFS client will get that particular chunk</a:t>
+            </a:r>
+          </a:p>
+          <a:p>
+            <a:pPr marL="171450" indent="-171450">
+              <a:buFont typeface="Wingdings" panose="05000000000000000000" pitchFamily="2" charset="2"/>
+              <a:buChar char="ü"/>
+            </a:pPr>
+            <a:endParaRPr lang="en-IN" sz="1000" dirty="0">
+              <a:latin typeface="Century Gothic" panose="020B0502020202020204" pitchFamily="34" charset="0"/>
+            </a:endParaRPr>
+          </a:p>
+          <a:p>
+            <a:pPr marL="171450" indent="-171450">
+              <a:buFont typeface="Wingdings" panose="05000000000000000000" pitchFamily="2" charset="2"/>
+              <a:buChar char="ü"/>
+            </a:pPr>
+            <a:r>
+              <a:rPr lang="en-IN" sz="1000" dirty="0">
+                <a:latin typeface="Century Gothic" panose="020B0502020202020204" pitchFamily="34" charset="0"/>
+              </a:rPr>
+              <a:t>The same logical process repeats for all chunks and after receiving all chunks, GFS client have logic to stitch chunks together and return file data to the application</a:t>
+            </a:r>
+          </a:p>
+          <a:p>
+            <a:pPr marL="171450" indent="-171450">
+              <a:buFont typeface="Wingdings" panose="05000000000000000000" pitchFamily="2" charset="2"/>
+              <a:buChar char="ü"/>
+            </a:pPr>
+            <a:endParaRPr lang="en-IN" sz="1000" dirty="0">
+              <a:latin typeface="Century Gothic" panose="020B0502020202020204" pitchFamily="34" charset="0"/>
+            </a:endParaRPr>
+          </a:p>
+          <a:p>
+            <a:pPr marL="171450" indent="-171450">
+              <a:buFont typeface="Wingdings" panose="05000000000000000000" pitchFamily="2" charset="2"/>
+              <a:buChar char="ü"/>
+            </a:pPr>
+            <a:r>
+              <a:rPr lang="en-IN" sz="1000" dirty="0">
+                <a:latin typeface="Century Gothic" panose="020B0502020202020204" pitchFamily="34" charset="0"/>
+              </a:rPr>
+              <a:t>Many other work done by this GFS client, additionally which will be discussed in later pages</a:t>
+            </a:r>
+          </a:p>
+          <a:p>
+            <a:pPr marL="171450" indent="-171450">
+              <a:buFont typeface="Wingdings" panose="05000000000000000000" pitchFamily="2" charset="2"/>
+              <a:buChar char="ü"/>
+            </a:pPr>
+            <a:endParaRPr lang="en-IN" sz="1000" dirty="0">
+              <a:latin typeface="Century Gothic" panose="020B0502020202020204" pitchFamily="34" charset="0"/>
+            </a:endParaRPr>
+          </a:p>
+          <a:p>
+            <a:pPr marL="171450" indent="-171450">
+              <a:buFont typeface="Wingdings" panose="05000000000000000000" pitchFamily="2" charset="2"/>
+              <a:buChar char="ü"/>
+            </a:pPr>
+            <a:endParaRPr lang="en-IN" sz="1000" dirty="0">
+              <a:latin typeface="Century Gothic" panose="020B0502020202020204" pitchFamily="34" charset="0"/>
+            </a:endParaRPr>
+          </a:p>
+          <a:p>
+            <a:endParaRPr lang="en-IN" sz="1000" dirty="0">
+              <a:latin typeface="Century Gothic" panose="020B0502020202020204" pitchFamily="34" charset="0"/>
+            </a:endParaRPr>
+          </a:p>
+          <a:p>
+            <a:endParaRPr lang="en-IN" sz="1000" dirty="0">
+              <a:latin typeface="Century Gothic" panose="020B0502020202020204" pitchFamily="34" charset="0"/>
+            </a:endParaRPr>
+          </a:p>
+          <a:p>
+            <a:endParaRPr lang="en-IN" dirty="0"/>
+          </a:p>
+          <a:p>
+            <a:endParaRPr lang="en-IN" dirty="0"/>
+          </a:p>
+          <a:p>
+            <a:r>
+              <a:rPr lang="en-IN" dirty="0"/>
+              <a:t> </a:t>
+            </a:r>
+          </a:p>
+        </p:txBody>
+      </p:sp>
+    </p:spTree>
+    <p:extLst>
+      <p:ext uri="{BB962C8B-B14F-4D97-AF65-F5344CB8AC3E}">
+        <p14:creationId xmlns:p14="http://schemas.microsoft.com/office/powerpoint/2010/main" val="665335138"/>
+      </p:ext>
+    </p:extLst>
+  </p:cSld>
+  <p:clrMapOvr>
+    <a:masterClrMapping/>
+  </p:clrMapOvr>
+</p:sld>
+</file>
+
+<file path=ppt/slides/slide12.xml><?xml version="1.0" encoding="utf-8"?>
+<p:sld xmlns:a="http://schemas.openxmlformats.org/drawingml/2006/main" xmlns:r="http://schemas.openxmlformats.org/officeDocument/2006/relationships" xmlns:p="http://schemas.openxmlformats.org/presentationml/2006/main">
+  <p:cSld>
+    <p:spTree>
+      <p:nvGrpSpPr>
+        <p:cNvPr id="1" name=""/>
+        <p:cNvGrpSpPr/>
+        <p:nvPr/>
+      </p:nvGrpSpPr>
+      <p:grpSpPr>
+        <a:xfrm>
+          <a:off x="0" y="0"/>
+          <a:ext cx="0" cy="0"/>
+          <a:chOff x="0" y="0"/>
+          <a:chExt cx="0" cy="0"/>
+        </a:xfrm>
+      </p:grpSpPr>
+      <p:sp>
+        <p:nvSpPr>
+          <p:cNvPr id="6" name="Rectangle 5">
+            <a:extLst>
+              <a:ext uri="{FF2B5EF4-FFF2-40B4-BE49-F238E27FC236}">
+                <a16:creationId xmlns:a16="http://schemas.microsoft.com/office/drawing/2014/main" id="{23D9A284-E705-4058-BC97-E411758071E2}"/>
+              </a:ext>
+            </a:extLst>
+          </p:cNvPr>
+          <p:cNvSpPr/>
+          <p:nvPr/>
+        </p:nvSpPr>
+        <p:spPr>
+          <a:xfrm>
+            <a:off x="0" y="0"/>
+            <a:ext cx="12192000" cy="623843"/>
+          </a:xfrm>
+          <a:prstGeom prst="rect">
+            <a:avLst/>
+          </a:prstGeom>
+        </p:spPr>
+        <p:style>
+          <a:lnRef idx="2">
+            <a:schemeClr val="accent1">
+              <a:shade val="50000"/>
+            </a:schemeClr>
+          </a:lnRef>
+          <a:fillRef idx="1">
+            <a:schemeClr val="accent1"/>
+          </a:fillRef>
+          <a:effectRef idx="0">
+            <a:schemeClr val="accent1"/>
+          </a:effectRef>
+          <a:fontRef idx="minor">
+            <a:schemeClr val="lt1"/>
+          </a:fontRef>
+        </p:style>
+        <p:txBody>
+          <a:bodyPr rtlCol="0" anchor="ctr"/>
+          <a:lstStyle/>
+          <a:p>
+            <a:pPr algn="ctr"/>
+            <a:endParaRPr lang="en-IN" b="1" i="0" dirty="0">
+              <a:effectLst/>
+              <a:latin typeface="Nunito Sans" pitchFamily="2" charset="0"/>
+            </a:endParaRPr>
+          </a:p>
+          <a:p>
+            <a:pPr algn="ctr"/>
+            <a:r>
+              <a:rPr lang="en-IN" b="1" i="0" dirty="0">
+                <a:effectLst/>
+                <a:latin typeface="Nunito Sans" pitchFamily="2" charset="0"/>
+              </a:rPr>
+              <a:t>GFS : Client Write Operation</a:t>
+            </a:r>
+          </a:p>
+          <a:p>
+            <a:pPr algn="ctr"/>
+            <a:endParaRPr lang="en-IN" dirty="0"/>
+          </a:p>
+        </p:txBody>
+      </p:sp>
+      <p:sp>
+        <p:nvSpPr>
+          <p:cNvPr id="8" name="Rectangle 7">
+            <a:extLst>
+              <a:ext uri="{FF2B5EF4-FFF2-40B4-BE49-F238E27FC236}">
+                <a16:creationId xmlns:a16="http://schemas.microsoft.com/office/drawing/2014/main" id="{3E776BD2-F992-4105-B179-A85CE4C534D9}"/>
+              </a:ext>
+            </a:extLst>
+          </p:cNvPr>
+          <p:cNvSpPr/>
+          <p:nvPr/>
+        </p:nvSpPr>
+        <p:spPr>
+          <a:xfrm>
+            <a:off x="169935" y="742956"/>
+            <a:ext cx="11871180" cy="5948407"/>
+          </a:xfrm>
+          <a:prstGeom prst="rect">
+            <a:avLst/>
+          </a:prstGeom>
+          <a:noFill/>
+          <a:ln w="9525" cap="flat" cmpd="sng" algn="ctr">
+            <a:solidFill>
+              <a:schemeClr val="accent3"/>
+            </a:solidFill>
+            <a:prstDash val="solid"/>
+            <a:round/>
+            <a:headEnd type="none" w="med" len="med"/>
+            <a:tailEnd type="none" w="med" len="med"/>
+          </a:ln>
+        </p:spPr>
+        <p:style>
+          <a:lnRef idx="0">
+            <a:scrgbClr r="0" g="0" b="0"/>
+          </a:lnRef>
+          <a:fillRef idx="0">
+            <a:scrgbClr r="0" g="0" b="0"/>
+          </a:fillRef>
+          <a:effectRef idx="0">
+            <a:scrgbClr r="0" g="0" b="0"/>
+          </a:effectRef>
+          <a:fontRef idx="minor">
+            <a:schemeClr val="accent3"/>
+          </a:fontRef>
+        </p:style>
+        <p:txBody>
+          <a:bodyPr rtlCol="0" anchor="ctr"/>
+          <a:lstStyle/>
+          <a:p>
+            <a:pPr algn="ctr"/>
+            <a:endParaRPr lang="en-IN" dirty="0"/>
+          </a:p>
+        </p:txBody>
+      </p:sp>
+      <p:sp>
+        <p:nvSpPr>
+          <p:cNvPr id="5" name="TextBox 4">
+            <a:extLst>
+              <a:ext uri="{FF2B5EF4-FFF2-40B4-BE49-F238E27FC236}">
+                <a16:creationId xmlns:a16="http://schemas.microsoft.com/office/drawing/2014/main" id="{0BF53E1C-7B85-488B-AA02-6BBA2B450CDF}"/>
+              </a:ext>
+            </a:extLst>
+          </p:cNvPr>
+          <p:cNvSpPr txBox="1"/>
+          <p:nvPr/>
+        </p:nvSpPr>
+        <p:spPr>
+          <a:xfrm>
+            <a:off x="265994" y="1351507"/>
+            <a:ext cx="6611056" cy="4062651"/>
+          </a:xfrm>
+          <a:prstGeom prst="rect">
+            <a:avLst/>
+          </a:prstGeom>
+          <a:noFill/>
+        </p:spPr>
+        <p:txBody>
+          <a:bodyPr wrap="square" rtlCol="0">
+            <a:spAutoFit/>
+          </a:bodyPr>
+          <a:lstStyle/>
+          <a:p>
+            <a:r>
+              <a:rPr lang="en-IN" sz="1400" b="1" dirty="0">
+                <a:latin typeface="Century Gothic" panose="020B0502020202020204" pitchFamily="34" charset="0"/>
+              </a:rPr>
+              <a:t>Chunk Lease</a:t>
+            </a:r>
+          </a:p>
+          <a:p>
+            <a:r>
+              <a:rPr lang="en-IN" sz="1000" dirty="0">
+                <a:latin typeface="Century Gothic" panose="020B0502020202020204" pitchFamily="34" charset="0"/>
+              </a:rPr>
+              <a:t>Let’s understand , why we need chunk lease?</a:t>
+            </a:r>
+          </a:p>
+          <a:p>
+            <a:r>
+              <a:rPr lang="en-IN" sz="1000" dirty="0">
+                <a:latin typeface="Century Gothic" panose="020B0502020202020204" pitchFamily="34" charset="0"/>
+              </a:rPr>
+              <a:t>Imagine the scenario, where chunk and their replica in another ChunkServer getting update simultaneously. At the update cycle, both chunk might have out of order data, meaning not in sync. </a:t>
+            </a:r>
+            <a:r>
+              <a:rPr lang="en-IN" sz="1000" b="1" dirty="0">
+                <a:latin typeface="Century Gothic" panose="020B0502020202020204" pitchFamily="34" charset="0"/>
+              </a:rPr>
+              <a:t>So, this is a problem, right?</a:t>
+            </a:r>
+          </a:p>
+          <a:p>
+            <a:r>
+              <a:rPr lang="en-IN" sz="1000" dirty="0">
+                <a:latin typeface="Century Gothic" panose="020B0502020202020204" pitchFamily="34" charset="0"/>
+              </a:rPr>
+              <a:t>So to solve this problem, GFS architect introduced Chunk Lease concept. And Global Master Server will hold and subsequent call from client till this chunk lease not release by current holder.</a:t>
+            </a:r>
+          </a:p>
+          <a:p>
+            <a:endParaRPr lang="en-IN" sz="1000" dirty="0">
+              <a:latin typeface="Century Gothic" panose="020B0502020202020204" pitchFamily="34" charset="0"/>
+            </a:endParaRPr>
+          </a:p>
+          <a:p>
+            <a:r>
+              <a:rPr lang="en-IN" sz="1000" dirty="0">
+                <a:latin typeface="Century Gothic" panose="020B0502020202020204" pitchFamily="34" charset="0"/>
+              </a:rPr>
+              <a:t>Also, there is chance of someone will hold that lease for longer and that will create some race condition. For optimal usage of Lease concept , GFS architect also introduced 60 seconds lease time window, and the ChunkServer who has this lease are also termed as Primary ChunkServer. They have responsibility to execute all update regarding the chunk sequentially. Here, Master server have responsibility of redirecting all the update call to the same primary server during this lease period.</a:t>
+            </a:r>
+          </a:p>
+          <a:p>
+            <a:endParaRPr lang="en-IN" sz="1000" dirty="0">
+              <a:latin typeface="Century Gothic" panose="020B0502020202020204" pitchFamily="34" charset="0"/>
+            </a:endParaRPr>
+          </a:p>
+          <a:p>
+            <a:r>
+              <a:rPr lang="en-US" sz="1000" dirty="0">
+                <a:latin typeface="Century Gothic" panose="020B0502020202020204" pitchFamily="34" charset="0"/>
+              </a:rPr>
+              <a:t>There is only one lease per chunk at any time, so that if two write requests go to the master, both see the same lease denoting the same primary.</a:t>
+            </a:r>
+          </a:p>
+          <a:p>
+            <a:endParaRPr lang="en-US" sz="1000" dirty="0">
+              <a:latin typeface="Century Gothic" panose="020B0502020202020204" pitchFamily="34" charset="0"/>
+            </a:endParaRPr>
+          </a:p>
+          <a:p>
+            <a:endParaRPr lang="en-IN" sz="1000" dirty="0">
+              <a:latin typeface="Century Gothic" panose="020B0502020202020204" pitchFamily="34" charset="0"/>
+            </a:endParaRPr>
+          </a:p>
+          <a:p>
+            <a:endParaRPr lang="en-IN" sz="1000" dirty="0">
+              <a:latin typeface="Century Gothic" panose="020B0502020202020204" pitchFamily="34" charset="0"/>
+            </a:endParaRPr>
+          </a:p>
+          <a:p>
+            <a:endParaRPr lang="en-IN" sz="1000" dirty="0">
+              <a:latin typeface="Century Gothic" panose="020B0502020202020204" pitchFamily="34" charset="0"/>
+            </a:endParaRPr>
+          </a:p>
+          <a:p>
+            <a:endParaRPr lang="en-IN" dirty="0"/>
+          </a:p>
+          <a:p>
+            <a:endParaRPr lang="en-IN" dirty="0"/>
+          </a:p>
+          <a:p>
+            <a:r>
+              <a:rPr lang="en-IN" dirty="0"/>
+              <a:t> </a:t>
+            </a:r>
+          </a:p>
+        </p:txBody>
+      </p:sp>
+      <p:pic>
+        <p:nvPicPr>
+          <p:cNvPr id="3" name="Picture 2">
+            <a:extLst>
+              <a:ext uri="{FF2B5EF4-FFF2-40B4-BE49-F238E27FC236}">
+                <a16:creationId xmlns:a16="http://schemas.microsoft.com/office/drawing/2014/main" id="{167D16AA-5199-4C6D-8D4E-078838EC5FC3}"/>
+              </a:ext>
+            </a:extLst>
+          </p:cNvPr>
+          <p:cNvPicPr>
+            <a:picLocks noChangeAspect="1"/>
+          </p:cNvPicPr>
+          <p:nvPr/>
+        </p:nvPicPr>
+        <p:blipFill>
+          <a:blip r:embed="rId2"/>
+          <a:stretch>
+            <a:fillRect/>
+          </a:stretch>
+        </p:blipFill>
+        <p:spPr>
+          <a:xfrm>
+            <a:off x="7192603" y="1459376"/>
+            <a:ext cx="4829462" cy="4308873"/>
+          </a:xfrm>
+          <a:prstGeom prst="rect">
+            <a:avLst/>
+          </a:prstGeom>
+        </p:spPr>
+      </p:pic>
+    </p:spTree>
+    <p:extLst>
+      <p:ext uri="{BB962C8B-B14F-4D97-AF65-F5344CB8AC3E}">
+        <p14:creationId xmlns:p14="http://schemas.microsoft.com/office/powerpoint/2010/main" val="3345868280"/>
+      </p:ext>
+    </p:extLst>
+  </p:cSld>
+  <p:clrMapOvr>
+    <a:masterClrMapping/>
+  </p:clrMapOvr>
+</p:sld>
+</file>
+
+<file path=ppt/slides/slide13.xml><?xml version="1.0" encoding="utf-8"?>
+<p:sld xmlns:a="http://schemas.openxmlformats.org/drawingml/2006/main" xmlns:r="http://schemas.openxmlformats.org/officeDocument/2006/relationships" xmlns:p="http://schemas.openxmlformats.org/presentationml/2006/main">
+  <p:cSld>
+    <p:spTree>
+      <p:nvGrpSpPr>
+        <p:cNvPr id="1" name=""/>
+        <p:cNvGrpSpPr/>
+        <p:nvPr/>
+      </p:nvGrpSpPr>
+      <p:grpSpPr>
+        <a:xfrm>
+          <a:off x="0" y="0"/>
+          <a:ext cx="0" cy="0"/>
+          <a:chOff x="0" y="0"/>
+          <a:chExt cx="0" cy="0"/>
+        </a:xfrm>
+      </p:grpSpPr>
+      <p:sp>
+        <p:nvSpPr>
+          <p:cNvPr id="6" name="Rectangle 5">
+            <a:extLst>
+              <a:ext uri="{FF2B5EF4-FFF2-40B4-BE49-F238E27FC236}">
+                <a16:creationId xmlns:a16="http://schemas.microsoft.com/office/drawing/2014/main" id="{23D9A284-E705-4058-BC97-E411758071E2}"/>
+              </a:ext>
+            </a:extLst>
+          </p:cNvPr>
+          <p:cNvSpPr/>
+          <p:nvPr/>
+        </p:nvSpPr>
+        <p:spPr>
+          <a:xfrm>
+            <a:off x="0" y="0"/>
+            <a:ext cx="12192000" cy="623843"/>
+          </a:xfrm>
+          <a:prstGeom prst="rect">
+            <a:avLst/>
+          </a:prstGeom>
+        </p:spPr>
+        <p:style>
+          <a:lnRef idx="2">
+            <a:schemeClr val="accent1">
+              <a:shade val="50000"/>
+            </a:schemeClr>
+          </a:lnRef>
+          <a:fillRef idx="1">
+            <a:schemeClr val="accent1"/>
+          </a:fillRef>
+          <a:effectRef idx="0">
+            <a:schemeClr val="accent1"/>
+          </a:effectRef>
+          <a:fontRef idx="minor">
+            <a:schemeClr val="lt1"/>
+          </a:fontRef>
+        </p:style>
+        <p:txBody>
+          <a:bodyPr rtlCol="0" anchor="ctr"/>
+          <a:lstStyle/>
+          <a:p>
+            <a:pPr algn="ctr"/>
+            <a:endParaRPr lang="en-IN" b="1" i="0" dirty="0">
+              <a:effectLst/>
+              <a:latin typeface="Nunito Sans" pitchFamily="2" charset="0"/>
+            </a:endParaRPr>
+          </a:p>
+          <a:p>
+            <a:pPr algn="ctr"/>
+            <a:r>
+              <a:rPr lang="en-IN" b="1" i="0" dirty="0">
+                <a:effectLst/>
+                <a:latin typeface="Nunito Sans" pitchFamily="2" charset="0"/>
+              </a:rPr>
+              <a:t>GFS : Client Write Operation</a:t>
+            </a:r>
+          </a:p>
+          <a:p>
+            <a:pPr algn="ctr"/>
+            <a:endParaRPr lang="en-IN" dirty="0"/>
+          </a:p>
+        </p:txBody>
+      </p:sp>
+      <p:sp>
+        <p:nvSpPr>
+          <p:cNvPr id="8" name="Rectangle 7">
+            <a:extLst>
+              <a:ext uri="{FF2B5EF4-FFF2-40B4-BE49-F238E27FC236}">
+                <a16:creationId xmlns:a16="http://schemas.microsoft.com/office/drawing/2014/main" id="{3E776BD2-F992-4105-B179-A85CE4C534D9}"/>
+              </a:ext>
+            </a:extLst>
+          </p:cNvPr>
+          <p:cNvSpPr/>
+          <p:nvPr/>
+        </p:nvSpPr>
+        <p:spPr>
+          <a:xfrm>
+            <a:off x="169935" y="742956"/>
+            <a:ext cx="11871180" cy="5948407"/>
+          </a:xfrm>
+          <a:prstGeom prst="rect">
+            <a:avLst/>
+          </a:prstGeom>
+          <a:noFill/>
+          <a:ln w="9525" cap="flat" cmpd="sng" algn="ctr">
+            <a:solidFill>
+              <a:schemeClr val="accent3"/>
+            </a:solidFill>
+            <a:prstDash val="solid"/>
+            <a:round/>
+            <a:headEnd type="none" w="med" len="med"/>
+            <a:tailEnd type="none" w="med" len="med"/>
+          </a:ln>
+        </p:spPr>
+        <p:style>
+          <a:lnRef idx="0">
+            <a:scrgbClr r="0" g="0" b="0"/>
+          </a:lnRef>
+          <a:fillRef idx="0">
+            <a:scrgbClr r="0" g="0" b="0"/>
+          </a:fillRef>
+          <a:effectRef idx="0">
+            <a:scrgbClr r="0" g="0" b="0"/>
+          </a:effectRef>
+          <a:fontRef idx="minor">
+            <a:schemeClr val="accent3"/>
+          </a:fontRef>
+        </p:style>
+        <p:txBody>
+          <a:bodyPr rtlCol="0" anchor="ctr"/>
+          <a:lstStyle/>
+          <a:p>
+            <a:pPr algn="ctr"/>
+            <a:endParaRPr lang="en-IN" dirty="0"/>
+          </a:p>
+        </p:txBody>
+      </p:sp>
+      <p:sp>
+        <p:nvSpPr>
+          <p:cNvPr id="5" name="TextBox 4">
+            <a:extLst>
+              <a:ext uri="{FF2B5EF4-FFF2-40B4-BE49-F238E27FC236}">
+                <a16:creationId xmlns:a16="http://schemas.microsoft.com/office/drawing/2014/main" id="{0BF53E1C-7B85-488B-AA02-6BBA2B450CDF}"/>
+              </a:ext>
+            </a:extLst>
+          </p:cNvPr>
+          <p:cNvSpPr txBox="1"/>
+          <p:nvPr/>
+        </p:nvSpPr>
+        <p:spPr>
+          <a:xfrm>
+            <a:off x="275519" y="913620"/>
+            <a:ext cx="6611056" cy="5816977"/>
+          </a:xfrm>
+          <a:prstGeom prst="rect">
+            <a:avLst/>
+          </a:prstGeom>
+          <a:noFill/>
+        </p:spPr>
+        <p:txBody>
+          <a:bodyPr wrap="square" rtlCol="0">
+            <a:spAutoFit/>
+          </a:bodyPr>
+          <a:lstStyle/>
+          <a:p>
+            <a:r>
+              <a:rPr lang="en-IN" sz="1400" b="1" dirty="0">
+                <a:latin typeface="Century Gothic" panose="020B0502020202020204" pitchFamily="34" charset="0"/>
+              </a:rPr>
+              <a:t>Data Writing</a:t>
+            </a:r>
+          </a:p>
+          <a:p>
+            <a:r>
+              <a:rPr lang="en-IN" sz="1000" dirty="0">
+                <a:latin typeface="Century Gothic" panose="020B0502020202020204" pitchFamily="34" charset="0"/>
+              </a:rPr>
+              <a:t>Let’s understand how actually data writing happen in GFS system.</a:t>
+            </a:r>
+          </a:p>
+          <a:p>
+            <a:endParaRPr lang="en-IN" sz="1000" dirty="0">
+              <a:latin typeface="Century Gothic" panose="020B0502020202020204" pitchFamily="34" charset="0"/>
+            </a:endParaRPr>
+          </a:p>
+          <a:p>
+            <a:r>
+              <a:rPr lang="en-IN" sz="1000" dirty="0">
+                <a:latin typeface="Century Gothic" panose="020B0502020202020204" pitchFamily="34" charset="0"/>
+              </a:rPr>
+              <a:t>So, in GFS data writing is divided into two phase</a:t>
+            </a:r>
+          </a:p>
+          <a:p>
+            <a:endParaRPr lang="en-IN" sz="1000" dirty="0">
+              <a:latin typeface="Century Gothic" panose="020B0502020202020204" pitchFamily="34" charset="0"/>
+            </a:endParaRPr>
+          </a:p>
+          <a:p>
+            <a:pPr marL="171450" indent="-171450">
+              <a:buFont typeface="Wingdings" panose="05000000000000000000" pitchFamily="2" charset="2"/>
+              <a:buChar char="q"/>
+            </a:pPr>
+            <a:r>
+              <a:rPr lang="en-IN" sz="1000" dirty="0">
+                <a:latin typeface="Century Gothic" panose="020B0502020202020204" pitchFamily="34" charset="0"/>
+              </a:rPr>
+              <a:t>Sending</a:t>
+            </a:r>
+          </a:p>
+          <a:p>
+            <a:r>
+              <a:rPr lang="en-IN" sz="1000" dirty="0">
+                <a:latin typeface="Century Gothic" panose="020B0502020202020204" pitchFamily="34" charset="0"/>
+              </a:rPr>
+              <a:t>Sending is like chaining of action. </a:t>
+            </a:r>
+          </a:p>
+          <a:p>
+            <a:r>
+              <a:rPr lang="en-US" sz="1000" dirty="0">
+                <a:latin typeface="Century Gothic" panose="020B0502020202020204" pitchFamily="34" charset="0"/>
+              </a:rPr>
+              <a:t>The client sends the data to the closest replica. Then replicas send the data in chain to all other replicas </a:t>
+            </a:r>
+            <a:r>
+              <a:rPr lang="en-US" sz="1000" b="1" dirty="0">
+                <a:latin typeface="Century Gothic" panose="020B0502020202020204" pitchFamily="34" charset="0"/>
+              </a:rPr>
+              <a:t>to maximize bandwidth and throughput</a:t>
+            </a:r>
+            <a:r>
+              <a:rPr lang="en-US" sz="1000" dirty="0">
+                <a:latin typeface="Century Gothic" panose="020B0502020202020204" pitchFamily="34" charset="0"/>
+              </a:rPr>
+              <a:t>. Eventually, all the replicas get the data.</a:t>
+            </a:r>
+            <a:endParaRPr lang="en-IN" sz="1000" dirty="0">
+              <a:latin typeface="Century Gothic" panose="020B0502020202020204" pitchFamily="34" charset="0"/>
+            </a:endParaRPr>
+          </a:p>
+          <a:p>
+            <a:endParaRPr lang="en-IN" sz="1000" dirty="0">
+              <a:latin typeface="Century Gothic" panose="020B0502020202020204" pitchFamily="34" charset="0"/>
+            </a:endParaRPr>
+          </a:p>
+          <a:p>
+            <a:pPr marL="171450" indent="-171450">
+              <a:buFont typeface="Wingdings" panose="05000000000000000000" pitchFamily="2" charset="2"/>
+              <a:buChar char="q"/>
+            </a:pPr>
+            <a:r>
+              <a:rPr lang="en-IN" sz="1000" dirty="0">
+                <a:latin typeface="Century Gothic" panose="020B0502020202020204" pitchFamily="34" charset="0"/>
+              </a:rPr>
+              <a:t>Writing</a:t>
+            </a:r>
+          </a:p>
+          <a:p>
+            <a:endParaRPr lang="en-US" sz="1000" dirty="0">
+              <a:latin typeface="Century Gothic" panose="020B0502020202020204" pitchFamily="34" charset="0"/>
+            </a:endParaRPr>
+          </a:p>
+          <a:p>
+            <a:r>
+              <a:rPr lang="en-US" sz="1000" dirty="0">
+                <a:latin typeface="Century Gothic" panose="020B0502020202020204" pitchFamily="34" charset="0"/>
+              </a:rPr>
+              <a:t>Post completion of sending data client then sends a write request to the primary, identifying the data that was sent in the previous phase. </a:t>
+            </a:r>
+          </a:p>
+          <a:p>
+            <a:endParaRPr lang="en-US" sz="1000" dirty="0">
+              <a:latin typeface="Century Gothic" panose="020B0502020202020204" pitchFamily="34" charset="0"/>
+            </a:endParaRPr>
+          </a:p>
+          <a:p>
+            <a:r>
+              <a:rPr lang="en-US" sz="1000" dirty="0">
+                <a:latin typeface="Century Gothic" panose="020B0502020202020204" pitchFamily="34" charset="0"/>
+              </a:rPr>
+              <a:t>The primary is responsible for the serialization of writes. It assigns consecutive serial numbers to all write requests that it has received, applies the writes to the file in serial-number order, and forwards the write requests in that order to the secondaries. </a:t>
+            </a:r>
+          </a:p>
+          <a:p>
+            <a:endParaRPr lang="en-US" sz="1000" dirty="0">
+              <a:latin typeface="Century Gothic" panose="020B0502020202020204" pitchFamily="34" charset="0"/>
+            </a:endParaRPr>
+          </a:p>
+          <a:p>
+            <a:r>
+              <a:rPr lang="en-US" sz="1000" dirty="0">
+                <a:latin typeface="Century Gothic" panose="020B0502020202020204" pitchFamily="34" charset="0"/>
+              </a:rPr>
+              <a:t>Once the primary gets acknowledgments from all the secondaries, the primary responds back to the client, and the write operation is complete.</a:t>
+            </a:r>
+          </a:p>
+          <a:p>
+            <a:endParaRPr lang="en-US" sz="1000" dirty="0">
+              <a:latin typeface="Century Gothic" panose="020B0502020202020204" pitchFamily="34" charset="0"/>
+            </a:endParaRPr>
+          </a:p>
+          <a:p>
+            <a:r>
+              <a:rPr lang="en-US" sz="1000" dirty="0">
+                <a:latin typeface="Century Gothic" panose="020B0502020202020204" pitchFamily="34" charset="0"/>
+              </a:rPr>
+              <a:t>Any failure or error will be backed with retries. On eventual failure, an error is returned to the client.</a:t>
+            </a:r>
+          </a:p>
+          <a:p>
+            <a:endParaRPr lang="en-IN" dirty="0"/>
+          </a:p>
+          <a:p>
+            <a:r>
+              <a:rPr lang="en-US" sz="1000" dirty="0">
+                <a:latin typeface="Century Gothic" panose="020B0502020202020204" pitchFamily="34" charset="0"/>
+              </a:rPr>
+              <a:t>The key point to note is that the data flow is different from the control flow. </a:t>
+            </a:r>
+          </a:p>
+          <a:p>
+            <a:endParaRPr lang="en-US" sz="1000" dirty="0">
+              <a:latin typeface="Century Gothic" panose="020B0502020202020204" pitchFamily="34" charset="0"/>
+            </a:endParaRPr>
+          </a:p>
+          <a:p>
+            <a:r>
+              <a:rPr lang="en-US" sz="1000" dirty="0">
+                <a:latin typeface="Century Gothic" panose="020B0502020202020204" pitchFamily="34" charset="0"/>
+              </a:rPr>
+              <a:t>The data flows from the client to a ChunkServer and then from that ChunkServer to another ChunkServer, until all ChunkServers that store replicas for that chunk have received the data. </a:t>
+            </a:r>
+          </a:p>
+          <a:p>
+            <a:endParaRPr lang="en-US" sz="1000" dirty="0">
+              <a:latin typeface="Century Gothic" panose="020B0502020202020204" pitchFamily="34" charset="0"/>
+            </a:endParaRPr>
+          </a:p>
+          <a:p>
+            <a:r>
+              <a:rPr lang="en-US" sz="1000" dirty="0">
+                <a:latin typeface="Century Gothic" panose="020B0502020202020204" pitchFamily="34" charset="0"/>
+              </a:rPr>
+              <a:t>The control (the write request) flow goes from the client to the primary ChunkServer for that chunk. The primary then forwards the request to all the secondaries. This ensures that the primary controls the order of writes even if it receives multiple concurrent write requests. All replicas will have data written in the same sequence. Chunk version numbers are used to detect if any replica has stale data which has not been updated because that ChunkServer was down during some update.</a:t>
+            </a:r>
+          </a:p>
+          <a:p>
+            <a:endParaRPr lang="en-US" sz="1000" dirty="0">
+              <a:latin typeface="Century Gothic" panose="020B0502020202020204" pitchFamily="34" charset="0"/>
+            </a:endParaRPr>
+          </a:p>
+          <a:p>
+            <a:endParaRPr lang="en-IN" sz="1000" dirty="0">
+              <a:latin typeface="Century Gothic" panose="020B0502020202020204" pitchFamily="34" charset="0"/>
+            </a:endParaRPr>
+          </a:p>
+        </p:txBody>
+      </p:sp>
+      <p:pic>
+        <p:nvPicPr>
+          <p:cNvPr id="3" name="Picture 2">
+            <a:extLst>
+              <a:ext uri="{FF2B5EF4-FFF2-40B4-BE49-F238E27FC236}">
+                <a16:creationId xmlns:a16="http://schemas.microsoft.com/office/drawing/2014/main" id="{167D16AA-5199-4C6D-8D4E-078838EC5FC3}"/>
+              </a:ext>
+            </a:extLst>
+          </p:cNvPr>
+          <p:cNvPicPr>
+            <a:picLocks noChangeAspect="1"/>
+          </p:cNvPicPr>
+          <p:nvPr/>
+        </p:nvPicPr>
+        <p:blipFill>
+          <a:blip r:embed="rId2"/>
+          <a:stretch>
+            <a:fillRect/>
+          </a:stretch>
+        </p:blipFill>
+        <p:spPr>
+          <a:xfrm>
+            <a:off x="7192603" y="1459376"/>
+            <a:ext cx="4829462" cy="4308873"/>
+          </a:xfrm>
+          <a:prstGeom prst="rect">
+            <a:avLst/>
+          </a:prstGeom>
+        </p:spPr>
+      </p:pic>
+    </p:spTree>
+    <p:extLst>
+      <p:ext uri="{BB962C8B-B14F-4D97-AF65-F5344CB8AC3E}">
+        <p14:creationId xmlns:p14="http://schemas.microsoft.com/office/powerpoint/2010/main" val="1392397509"/>
+      </p:ext>
+    </p:extLst>
+  </p:cSld>
+  <p:clrMapOvr>
+    <a:masterClrMapping/>
+  </p:clrMapOvr>
+</p:sld>
+</file>
+
+<file path=ppt/slides/slide14.xml><?xml version="1.0" encoding="utf-8"?>
+<p:sld xmlns:a="http://schemas.openxmlformats.org/drawingml/2006/main" xmlns:r="http://schemas.openxmlformats.org/officeDocument/2006/relationships" xmlns:p="http://schemas.openxmlformats.org/presentationml/2006/main">
+  <p:cSld>
+    <p:spTree>
+      <p:nvGrpSpPr>
+        <p:cNvPr id="1" name=""/>
+        <p:cNvGrpSpPr/>
+        <p:nvPr/>
+      </p:nvGrpSpPr>
+      <p:grpSpPr>
+        <a:xfrm>
+          <a:off x="0" y="0"/>
+          <a:ext cx="0" cy="0"/>
+          <a:chOff x="0" y="0"/>
+          <a:chExt cx="0" cy="0"/>
+        </a:xfrm>
+      </p:grpSpPr>
+      <p:sp>
+        <p:nvSpPr>
+          <p:cNvPr id="6" name="Rectangle 5">
+            <a:extLst>
+              <a:ext uri="{FF2B5EF4-FFF2-40B4-BE49-F238E27FC236}">
+                <a16:creationId xmlns:a16="http://schemas.microsoft.com/office/drawing/2014/main" id="{23D9A284-E705-4058-BC97-E411758071E2}"/>
+              </a:ext>
+            </a:extLst>
+          </p:cNvPr>
+          <p:cNvSpPr/>
+          <p:nvPr/>
+        </p:nvSpPr>
+        <p:spPr>
+          <a:xfrm>
+            <a:off x="0" y="0"/>
+            <a:ext cx="12192000" cy="623843"/>
+          </a:xfrm>
+          <a:prstGeom prst="rect">
+            <a:avLst/>
+          </a:prstGeom>
+        </p:spPr>
+        <p:style>
+          <a:lnRef idx="2">
+            <a:schemeClr val="accent1">
+              <a:shade val="50000"/>
+            </a:schemeClr>
+          </a:lnRef>
+          <a:fillRef idx="1">
+            <a:schemeClr val="accent1"/>
+          </a:fillRef>
+          <a:effectRef idx="0">
+            <a:schemeClr val="accent1"/>
+          </a:effectRef>
+          <a:fontRef idx="minor">
+            <a:schemeClr val="lt1"/>
+          </a:fontRef>
+        </p:style>
+        <p:txBody>
+          <a:bodyPr rtlCol="0" anchor="ctr"/>
+          <a:lstStyle/>
+          <a:p>
+            <a:pPr algn="ctr"/>
+            <a:endParaRPr lang="en-IN" b="1" i="0" dirty="0">
+              <a:effectLst/>
+              <a:latin typeface="Nunito Sans" pitchFamily="2" charset="0"/>
+            </a:endParaRPr>
+          </a:p>
+          <a:p>
+            <a:pPr algn="ctr"/>
+            <a:r>
+              <a:rPr lang="en-IN" b="1" i="0" dirty="0">
+                <a:effectLst/>
+                <a:latin typeface="Nunito Sans" pitchFamily="2" charset="0"/>
+              </a:rPr>
+              <a:t>GFS : Client Append Operation</a:t>
+            </a:r>
+          </a:p>
+          <a:p>
+            <a:pPr algn="ctr"/>
+            <a:endParaRPr lang="en-IN" dirty="0"/>
+          </a:p>
+        </p:txBody>
+      </p:sp>
+      <p:sp>
+        <p:nvSpPr>
+          <p:cNvPr id="8" name="Rectangle 7">
+            <a:extLst>
+              <a:ext uri="{FF2B5EF4-FFF2-40B4-BE49-F238E27FC236}">
+                <a16:creationId xmlns:a16="http://schemas.microsoft.com/office/drawing/2014/main" id="{3E776BD2-F992-4105-B179-A85CE4C534D9}"/>
+              </a:ext>
+            </a:extLst>
+          </p:cNvPr>
+          <p:cNvSpPr/>
+          <p:nvPr/>
+        </p:nvSpPr>
+        <p:spPr>
+          <a:xfrm>
+            <a:off x="169935" y="742956"/>
+            <a:ext cx="11871180" cy="5948407"/>
+          </a:xfrm>
+          <a:prstGeom prst="rect">
+            <a:avLst/>
+          </a:prstGeom>
+          <a:noFill/>
+          <a:ln w="9525" cap="flat" cmpd="sng" algn="ctr">
+            <a:solidFill>
+              <a:schemeClr val="accent3"/>
+            </a:solidFill>
+            <a:prstDash val="solid"/>
+            <a:round/>
+            <a:headEnd type="none" w="med" len="med"/>
+            <a:tailEnd type="none" w="med" len="med"/>
+          </a:ln>
+        </p:spPr>
+        <p:style>
+          <a:lnRef idx="0">
+            <a:scrgbClr r="0" g="0" b="0"/>
+          </a:lnRef>
+          <a:fillRef idx="0">
+            <a:scrgbClr r="0" g="0" b="0"/>
+          </a:fillRef>
+          <a:effectRef idx="0">
+            <a:scrgbClr r="0" g="0" b="0"/>
+          </a:effectRef>
+          <a:fontRef idx="minor">
+            <a:schemeClr val="accent3"/>
+          </a:fontRef>
+        </p:style>
+        <p:txBody>
+          <a:bodyPr rtlCol="0" anchor="ctr"/>
+          <a:lstStyle/>
+          <a:p>
+            <a:pPr algn="ctr"/>
+            <a:endParaRPr lang="en-IN" dirty="0"/>
+          </a:p>
+        </p:txBody>
+      </p:sp>
+      <p:sp>
+        <p:nvSpPr>
+          <p:cNvPr id="5" name="TextBox 4">
+            <a:extLst>
+              <a:ext uri="{FF2B5EF4-FFF2-40B4-BE49-F238E27FC236}">
+                <a16:creationId xmlns:a16="http://schemas.microsoft.com/office/drawing/2014/main" id="{0BF53E1C-7B85-488B-AA02-6BBA2B450CDF}"/>
+              </a:ext>
+            </a:extLst>
+          </p:cNvPr>
+          <p:cNvSpPr txBox="1"/>
+          <p:nvPr/>
+        </p:nvSpPr>
+        <p:spPr>
+          <a:xfrm>
+            <a:off x="275519" y="913620"/>
+            <a:ext cx="11583106" cy="1754326"/>
+          </a:xfrm>
+          <a:prstGeom prst="rect">
+            <a:avLst/>
+          </a:prstGeom>
+          <a:noFill/>
+        </p:spPr>
+        <p:txBody>
+          <a:bodyPr wrap="square" rtlCol="0">
+            <a:spAutoFit/>
+          </a:bodyPr>
+          <a:lstStyle/>
+          <a:p>
+            <a:r>
+              <a:rPr lang="en-IN" sz="1400" b="1" dirty="0">
+                <a:latin typeface="Century Gothic" panose="020B0502020202020204" pitchFamily="34" charset="0"/>
+              </a:rPr>
+              <a:t>Append Operation</a:t>
+            </a:r>
+          </a:p>
+          <a:p>
+            <a:endParaRPr lang="en-IN" sz="1400" b="1" dirty="0">
+              <a:latin typeface="Century Gothic" panose="020B0502020202020204" pitchFamily="34" charset="0"/>
+            </a:endParaRPr>
+          </a:p>
+          <a:p>
+            <a:r>
+              <a:rPr lang="en-US" sz="1000" dirty="0">
+                <a:latin typeface="Century Gothic" panose="020B0502020202020204" pitchFamily="34" charset="0"/>
+              </a:rPr>
+              <a:t>Record append operation is optimized in a unique way that distinguishes GFS from other distributed file systems.</a:t>
+            </a:r>
+            <a:endParaRPr lang="en-IN" sz="1000" dirty="0">
+              <a:latin typeface="Century Gothic" panose="020B0502020202020204" pitchFamily="34" charset="0"/>
+            </a:endParaRPr>
+          </a:p>
+          <a:p>
+            <a:endParaRPr lang="en-IN" sz="1000" dirty="0">
+              <a:latin typeface="Century Gothic" panose="020B0502020202020204" pitchFamily="34" charset="0"/>
+            </a:endParaRPr>
+          </a:p>
+          <a:p>
+            <a:endParaRPr lang="en-IN" sz="1000" dirty="0">
+              <a:latin typeface="Century Gothic" panose="020B0502020202020204" pitchFamily="34" charset="0"/>
+            </a:endParaRPr>
+          </a:p>
+          <a:p>
+            <a:endParaRPr lang="en-US" sz="1000" dirty="0">
+              <a:latin typeface="Century Gothic" panose="020B0502020202020204" pitchFamily="34" charset="0"/>
+            </a:endParaRPr>
+          </a:p>
+          <a:p>
+            <a:endParaRPr lang="en-US" sz="1000" dirty="0">
+              <a:latin typeface="Century Gothic" panose="020B0502020202020204" pitchFamily="34" charset="0"/>
+            </a:endParaRPr>
+          </a:p>
+          <a:p>
+            <a:endParaRPr lang="en-US" sz="1000" dirty="0">
+              <a:latin typeface="Century Gothic" panose="020B0502020202020204" pitchFamily="34" charset="0"/>
+            </a:endParaRPr>
+          </a:p>
+          <a:p>
+            <a:endParaRPr lang="en-US" sz="1000" dirty="0">
+              <a:latin typeface="Century Gothic" panose="020B0502020202020204" pitchFamily="34" charset="0"/>
+            </a:endParaRPr>
+          </a:p>
+          <a:p>
+            <a:endParaRPr lang="en-IN" sz="1000" dirty="0">
+              <a:latin typeface="Century Gothic" panose="020B0502020202020204" pitchFamily="34" charset="0"/>
+            </a:endParaRPr>
+          </a:p>
+        </p:txBody>
+      </p:sp>
+    </p:spTree>
+    <p:extLst>
+      <p:ext uri="{BB962C8B-B14F-4D97-AF65-F5344CB8AC3E}">
+        <p14:creationId xmlns:p14="http://schemas.microsoft.com/office/powerpoint/2010/main" val="2500068148"/>
+      </p:ext>
+    </p:extLst>
+  </p:cSld>
+  <p:clrMapOvr>
+    <a:masterClrMapping/>
+  </p:clrMapOvr>
+</p:sld>
+</file>
+
 <file path=ppt/slides/slide2.xml><?xml version="1.0" encoding="utf-8"?>
 <p:sld xmlns:a="http://schemas.openxmlformats.org/drawingml/2006/main" xmlns:r="http://schemas.openxmlformats.org/officeDocument/2006/relationships" xmlns:p="http://schemas.openxmlformats.org/presentationml/2006/main">
   <p:cSld>
@@ -12702,23 +14725,6 @@
               <a:buNone/>
             </a:pPr>
             <a:r>
-              <a:rPr lang="en-US" sz="1200" b="1" dirty="0">
-                <a:solidFill>
-                  <a:srgbClr val="3D3D4E"/>
-                </a:solidFill>
-                <a:latin typeface="Century Gothic" panose="020B0502020202020204" pitchFamily="34" charset="0"/>
-              </a:rPr>
-              <a:t>Master Operations</a:t>
-            </a:r>
-          </a:p>
-          <a:p>
-            <a:pPr marL="0" indent="0">
-              <a:spcBef>
-                <a:spcPts val="600"/>
-              </a:spcBef>
-              <a:buNone/>
-            </a:pPr>
-            <a:r>
               <a:rPr lang="en-US" sz="1000" b="0" i="0" dirty="0">
                 <a:solidFill>
                   <a:srgbClr val="3D3D4E"/>
@@ -12825,7 +14831,7 @@
               </a:spcBef>
               <a:buNone/>
             </a:pPr>
-            <a:endParaRPr lang="en-US" sz="1000">
+            <a:endParaRPr lang="en-US" sz="1000" dirty="0">
               <a:latin typeface="Century Gothic" panose="020B0502020202020204" pitchFamily="34" charset="0"/>
             </a:endParaRPr>
           </a:p>
@@ -12836,9 +14842,217 @@
               </a:spcBef>
               <a:buNone/>
             </a:pPr>
+            <a:r>
+              <a:rPr lang="en-US" sz="1400" b="1" dirty="0">
+                <a:solidFill>
+                  <a:srgbClr val="3D3D4E"/>
+                </a:solidFill>
+                <a:latin typeface="Century Gothic" panose="020B0502020202020204" pitchFamily="34" charset="0"/>
+              </a:rPr>
+              <a:t>Namespace Management &amp; Locking</a:t>
+            </a:r>
+          </a:p>
+          <a:p>
+            <a:pPr marL="0" indent="0">
+              <a:spcBef>
+                <a:spcPts val="600"/>
+              </a:spcBef>
+              <a:buNone/>
+            </a:pPr>
+            <a:r>
+              <a:rPr lang="en-US" sz="1000" dirty="0">
+                <a:latin typeface="Century Gothic" panose="020B0502020202020204" pitchFamily="34" charset="0"/>
+              </a:rPr>
+              <a:t>GFS does not have an </a:t>
+            </a:r>
+            <a:r>
+              <a:rPr lang="en-US" sz="1000" dirty="0" err="1">
+                <a:latin typeface="Century Gothic" panose="020B0502020202020204" pitchFamily="34" charset="0"/>
+              </a:rPr>
+              <a:t>i</a:t>
+            </a:r>
+            <a:r>
+              <a:rPr lang="en-US" sz="1000" dirty="0">
+                <a:latin typeface="Century Gothic" panose="020B0502020202020204" pitchFamily="34" charset="0"/>
+              </a:rPr>
+              <a:t>-node like tree structure for directories and files. Instead, it has a hash-map that maps a filename to its metadata, and reader-writer locks are applied on each node of the hash table for synchronization.</a:t>
+            </a:r>
+          </a:p>
+          <a:p>
+            <a:pPr marL="0" indent="0">
+              <a:spcBef>
+                <a:spcPts val="600"/>
+              </a:spcBef>
+              <a:buNone/>
+            </a:pPr>
             <a:endParaRPr lang="en-US" sz="1000" dirty="0">
               <a:latin typeface="Century Gothic" panose="020B0502020202020204" pitchFamily="34" charset="0"/>
             </a:endParaRPr>
+          </a:p>
+          <a:p>
+            <a:pPr>
+              <a:spcBef>
+                <a:spcPts val="600"/>
+              </a:spcBef>
+              <a:buFont typeface="Wingdings" panose="05000000000000000000" pitchFamily="2" charset="2"/>
+              <a:buChar char="ü"/>
+            </a:pPr>
+            <a:r>
+              <a:rPr lang="en-US" sz="1000" dirty="0">
+                <a:latin typeface="Century Gothic" panose="020B0502020202020204" pitchFamily="34" charset="0"/>
+              </a:rPr>
+              <a:t>Each filename or absolute directory name has an associated read &amp; write lock</a:t>
+            </a:r>
+          </a:p>
+          <a:p>
+            <a:pPr>
+              <a:spcBef>
+                <a:spcPts val="600"/>
+              </a:spcBef>
+              <a:buFont typeface="Wingdings" panose="05000000000000000000" pitchFamily="2" charset="2"/>
+              <a:buChar char="ü"/>
+            </a:pPr>
+            <a:r>
+              <a:rPr lang="en-US" sz="1000" dirty="0">
+                <a:latin typeface="Century Gothic" panose="020B0502020202020204" pitchFamily="34" charset="0"/>
+              </a:rPr>
+              <a:t>Each master operation need to be protected with proper lacking so that no simultaneous operation directory allowed but at leaf level(meaning of file level)not allowed</a:t>
+            </a:r>
+          </a:p>
+          <a:p>
+            <a:pPr>
+              <a:spcBef>
+                <a:spcPts val="600"/>
+              </a:spcBef>
+              <a:buFont typeface="Wingdings" panose="05000000000000000000" pitchFamily="2" charset="2"/>
+              <a:buChar char="ü"/>
+            </a:pPr>
+            <a:r>
+              <a:rPr lang="en-US" sz="1000" dirty="0">
+                <a:latin typeface="Century Gothic" panose="020B0502020202020204" pitchFamily="34" charset="0"/>
+              </a:rPr>
+              <a:t>To make operation on /dir1/dir2/leaf, it first needs the following locks:</a:t>
+            </a:r>
+          </a:p>
+          <a:p>
+            <a:pPr lvl="1">
+              <a:spcBef>
+                <a:spcPts val="600"/>
+              </a:spcBef>
+              <a:buFont typeface="Wingdings" panose="05000000000000000000" pitchFamily="2" charset="2"/>
+              <a:buChar char="q"/>
+            </a:pPr>
+            <a:r>
+              <a:rPr lang="en-US" sz="1000" dirty="0">
+                <a:latin typeface="Century Gothic" panose="020B0502020202020204" pitchFamily="34" charset="0"/>
+              </a:rPr>
+              <a:t>Reader lock on /dir1</a:t>
+            </a:r>
+          </a:p>
+          <a:p>
+            <a:pPr lvl="1">
+              <a:spcBef>
+                <a:spcPts val="600"/>
+              </a:spcBef>
+              <a:buFont typeface="Wingdings" panose="05000000000000000000" pitchFamily="2" charset="2"/>
+              <a:buChar char="q"/>
+            </a:pPr>
+            <a:r>
+              <a:rPr lang="en-US" sz="1000" dirty="0">
+                <a:latin typeface="Century Gothic" panose="020B0502020202020204" pitchFamily="34" charset="0"/>
+              </a:rPr>
+              <a:t>Reader lock on /dir1/dir2</a:t>
+            </a:r>
+          </a:p>
+          <a:p>
+            <a:pPr lvl="1">
+              <a:spcBef>
+                <a:spcPts val="600"/>
+              </a:spcBef>
+              <a:buFont typeface="Wingdings" panose="05000000000000000000" pitchFamily="2" charset="2"/>
+              <a:buChar char="q"/>
+            </a:pPr>
+            <a:r>
+              <a:rPr lang="en-US" sz="1000" dirty="0">
+                <a:latin typeface="Century Gothic" panose="020B0502020202020204" pitchFamily="34" charset="0"/>
+              </a:rPr>
+              <a:t>Reader or Writer lock on /dir1/dir2/leaf</a:t>
+            </a:r>
+          </a:p>
+          <a:p>
+            <a:pPr>
+              <a:spcBef>
+                <a:spcPts val="600"/>
+              </a:spcBef>
+              <a:buFont typeface="Wingdings" panose="05000000000000000000" pitchFamily="2" charset="2"/>
+              <a:buChar char="ü"/>
+            </a:pPr>
+            <a:r>
+              <a:rPr lang="en-US" sz="1000" dirty="0">
+                <a:latin typeface="Century Gothic" panose="020B0502020202020204" pitchFamily="34" charset="0"/>
+              </a:rPr>
+              <a:t>File creation does not require write-lock on the parent directory; a read-lock on its name is sufficient to protect the parent directory from deletion, rename, or snapshot.</a:t>
+            </a:r>
+          </a:p>
+          <a:p>
+            <a:pPr>
+              <a:spcBef>
+                <a:spcPts val="600"/>
+              </a:spcBef>
+              <a:buFont typeface="Wingdings" panose="05000000000000000000" pitchFamily="2" charset="2"/>
+              <a:buChar char="ü"/>
+            </a:pPr>
+            <a:r>
+              <a:rPr lang="en-US" sz="1000" dirty="0">
+                <a:latin typeface="Century Gothic" panose="020B0502020202020204" pitchFamily="34" charset="0"/>
+              </a:rPr>
+              <a:t>Write-lock on a file name stops attempts to create multiple files with the same name.</a:t>
+            </a:r>
+          </a:p>
+          <a:p>
+            <a:pPr>
+              <a:spcBef>
+                <a:spcPts val="600"/>
+              </a:spcBef>
+              <a:buFont typeface="Wingdings" panose="05000000000000000000" pitchFamily="2" charset="2"/>
+              <a:buChar char="ü"/>
+            </a:pPr>
+            <a:r>
+              <a:rPr lang="en-US" sz="1000" dirty="0">
+                <a:latin typeface="Century Gothic" panose="020B0502020202020204" pitchFamily="34" charset="0"/>
+              </a:rPr>
+              <a:t>Locks are acquired in a consistent order to prevent deadlock:</a:t>
+            </a:r>
+          </a:p>
+          <a:p>
+            <a:pPr lvl="1">
+              <a:spcBef>
+                <a:spcPts val="600"/>
+              </a:spcBef>
+              <a:buFont typeface="Wingdings" panose="05000000000000000000" pitchFamily="2" charset="2"/>
+              <a:buChar char="q"/>
+            </a:pPr>
+            <a:r>
+              <a:rPr lang="en-US" sz="1000" dirty="0">
+                <a:latin typeface="Century Gothic" panose="020B0502020202020204" pitchFamily="34" charset="0"/>
+              </a:rPr>
+              <a:t>First ordered by level in the namespace tree</a:t>
+            </a:r>
+          </a:p>
+          <a:p>
+            <a:pPr lvl="1">
+              <a:spcBef>
+                <a:spcPts val="600"/>
+              </a:spcBef>
+              <a:buFont typeface="Wingdings" panose="05000000000000000000" pitchFamily="2" charset="2"/>
+              <a:buChar char="q"/>
+            </a:pPr>
+            <a:r>
+              <a:rPr lang="en-US" sz="1000" dirty="0">
+                <a:latin typeface="Century Gothic" panose="020B0502020202020204" pitchFamily="34" charset="0"/>
+              </a:rPr>
+              <a:t>Lexicographically ordered within the same level</a:t>
+            </a:r>
           </a:p>
           <a:p>
             <a:pPr>
@@ -13276,6 +15490,938 @@
           <a:p>
             <a:pPr algn="ctr"/>
             <a:endParaRPr lang="en-IN" dirty="0"/>
+          </a:p>
+        </p:txBody>
+      </p:sp>
+      <p:sp>
+        <p:nvSpPr>
+          <p:cNvPr id="5" name="Content Placeholder 7">
+            <a:extLst>
+              <a:ext uri="{FF2B5EF4-FFF2-40B4-BE49-F238E27FC236}">
+                <a16:creationId xmlns:a16="http://schemas.microsoft.com/office/drawing/2014/main" id="{09668F57-BABD-4534-88D6-2CD6A45F19EB}"/>
+              </a:ext>
+            </a:extLst>
+          </p:cNvPr>
+          <p:cNvSpPr txBox="1">
+            <a:spLocks/>
+          </p:cNvSpPr>
+          <p:nvPr/>
+        </p:nvSpPr>
+        <p:spPr>
+          <a:xfrm>
+            <a:off x="6096000" y="802513"/>
+            <a:ext cx="5821290" cy="5829292"/>
+          </a:xfrm>
+          <a:prstGeom prst="rect">
+            <a:avLst/>
+          </a:prstGeom>
+        </p:spPr>
+        <p:txBody>
+          <a:bodyPr vert="horz" lIns="91440" tIns="45720" rIns="91440" bIns="45720" rtlCol="0">
+            <a:normAutofit/>
+          </a:bodyPr>
+          <a:lstStyle>
+            <a:lvl1pPr marL="228600" indent="-228600" algn="l" defTabSz="914400" rtl="0" eaLnBrk="1" latinLnBrk="0" hangingPunct="1">
+              <a:lnSpc>
+                <a:spcPct val="90000"/>
+              </a:lnSpc>
+              <a:spcBef>
+                <a:spcPts val="1000"/>
+              </a:spcBef>
+              <a:buFont typeface="Arial" panose="020B0604020202020204" pitchFamily="34" charset="0"/>
+              <a:buChar char="•"/>
+              <a:defRPr sz="2800" kern="1200">
+                <a:solidFill>
+                  <a:schemeClr val="tx1"/>
+                </a:solidFill>
+                <a:latin typeface="+mn-lt"/>
+                <a:ea typeface="+mn-ea"/>
+                <a:cs typeface="+mn-cs"/>
+              </a:defRPr>
+            </a:lvl1pPr>
+            <a:lvl2pPr marL="685800" indent="-228600" algn="l" defTabSz="914400" rtl="0" eaLnBrk="1" latinLnBrk="0" hangingPunct="1">
+              <a:lnSpc>
+                <a:spcPct val="90000"/>
+              </a:lnSpc>
+              <a:spcBef>
+                <a:spcPts val="500"/>
+              </a:spcBef>
+              <a:buFont typeface="Arial" panose="020B0604020202020204" pitchFamily="34" charset="0"/>
+              <a:buChar char="•"/>
+              <a:defRPr sz="2400" kern="1200">
+                <a:solidFill>
+                  <a:schemeClr val="tx1"/>
+                </a:solidFill>
+                <a:latin typeface="+mn-lt"/>
+                <a:ea typeface="+mn-ea"/>
+                <a:cs typeface="+mn-cs"/>
+              </a:defRPr>
+            </a:lvl2pPr>
+            <a:lvl3pPr marL="1143000" indent="-228600" algn="l" defTabSz="914400" rtl="0" eaLnBrk="1" latinLnBrk="0" hangingPunct="1">
+              <a:lnSpc>
+                <a:spcPct val="90000"/>
+              </a:lnSpc>
+              <a:spcBef>
+                <a:spcPts val="500"/>
+              </a:spcBef>
+              <a:buFont typeface="Arial" panose="020B0604020202020204" pitchFamily="34" charset="0"/>
+              <a:buChar char="•"/>
+              <a:defRPr sz="2000" kern="1200">
+                <a:solidFill>
+                  <a:schemeClr val="tx1"/>
+                </a:solidFill>
+                <a:latin typeface="+mn-lt"/>
+                <a:ea typeface="+mn-ea"/>
+                <a:cs typeface="+mn-cs"/>
+              </a:defRPr>
+            </a:lvl3pPr>
+            <a:lvl4pPr marL="1600200" indent="-228600" algn="l" defTabSz="914400" rtl="0" eaLnBrk="1" latinLnBrk="0" hangingPunct="1">
+              <a:lnSpc>
+                <a:spcPct val="90000"/>
+              </a:lnSpc>
+              <a:spcBef>
+                <a:spcPts val="500"/>
+              </a:spcBef>
+              <a:buFont typeface="Arial" panose="020B0604020202020204" pitchFamily="34" charset="0"/>
+              <a:buChar char="•"/>
+              <a:defRPr sz="1800" kern="1200">
+                <a:solidFill>
+                  <a:schemeClr val="tx1"/>
+                </a:solidFill>
+                <a:latin typeface="+mn-lt"/>
+                <a:ea typeface="+mn-ea"/>
+                <a:cs typeface="+mn-cs"/>
+              </a:defRPr>
+            </a:lvl4pPr>
+            <a:lvl5pPr marL="2057400" indent="-228600" algn="l" defTabSz="914400" rtl="0" eaLnBrk="1" latinLnBrk="0" hangingPunct="1">
+              <a:lnSpc>
+                <a:spcPct val="90000"/>
+              </a:lnSpc>
+              <a:spcBef>
+                <a:spcPts val="500"/>
+              </a:spcBef>
+              <a:buFont typeface="Arial" panose="020B0604020202020204" pitchFamily="34" charset="0"/>
+              <a:buChar char="•"/>
+              <a:defRPr sz="1800" kern="1200">
+                <a:solidFill>
+                  <a:schemeClr val="tx1"/>
+                </a:solidFill>
+                <a:latin typeface="+mn-lt"/>
+                <a:ea typeface="+mn-ea"/>
+                <a:cs typeface="+mn-cs"/>
+              </a:defRPr>
+            </a:lvl5pPr>
+            <a:lvl6pPr marL="2514600" indent="-228600" algn="l" defTabSz="914400" rtl="0" eaLnBrk="1" latinLnBrk="0" hangingPunct="1">
+              <a:lnSpc>
+                <a:spcPct val="90000"/>
+              </a:lnSpc>
+              <a:spcBef>
+                <a:spcPts val="500"/>
+              </a:spcBef>
+              <a:buFont typeface="Arial" panose="020B0604020202020204" pitchFamily="34" charset="0"/>
+              <a:buChar char="•"/>
+              <a:defRPr sz="1800" kern="1200">
+                <a:solidFill>
+                  <a:schemeClr val="tx1"/>
+                </a:solidFill>
+                <a:latin typeface="+mn-lt"/>
+                <a:ea typeface="+mn-ea"/>
+                <a:cs typeface="+mn-cs"/>
+              </a:defRPr>
+            </a:lvl6pPr>
+            <a:lvl7pPr marL="2971800" indent="-228600" algn="l" defTabSz="914400" rtl="0" eaLnBrk="1" latinLnBrk="0" hangingPunct="1">
+              <a:lnSpc>
+                <a:spcPct val="90000"/>
+              </a:lnSpc>
+              <a:spcBef>
+                <a:spcPts val="500"/>
+              </a:spcBef>
+              <a:buFont typeface="Arial" panose="020B0604020202020204" pitchFamily="34" charset="0"/>
+              <a:buChar char="•"/>
+              <a:defRPr sz="1800" kern="1200">
+                <a:solidFill>
+                  <a:schemeClr val="tx1"/>
+                </a:solidFill>
+                <a:latin typeface="+mn-lt"/>
+                <a:ea typeface="+mn-ea"/>
+                <a:cs typeface="+mn-cs"/>
+              </a:defRPr>
+            </a:lvl7pPr>
+            <a:lvl8pPr marL="3429000" indent="-228600" algn="l" defTabSz="914400" rtl="0" eaLnBrk="1" latinLnBrk="0" hangingPunct="1">
+              <a:lnSpc>
+                <a:spcPct val="90000"/>
+              </a:lnSpc>
+              <a:spcBef>
+                <a:spcPts val="500"/>
+              </a:spcBef>
+              <a:buFont typeface="Arial" panose="020B0604020202020204" pitchFamily="34" charset="0"/>
+              <a:buChar char="•"/>
+              <a:defRPr sz="1800" kern="1200">
+                <a:solidFill>
+                  <a:schemeClr val="tx1"/>
+                </a:solidFill>
+                <a:latin typeface="+mn-lt"/>
+                <a:ea typeface="+mn-ea"/>
+                <a:cs typeface="+mn-cs"/>
+              </a:defRPr>
+            </a:lvl8pPr>
+            <a:lvl9pPr marL="3886200" indent="-228600" algn="l" defTabSz="914400" rtl="0" eaLnBrk="1" latinLnBrk="0" hangingPunct="1">
+              <a:lnSpc>
+                <a:spcPct val="90000"/>
+              </a:lnSpc>
+              <a:spcBef>
+                <a:spcPts val="500"/>
+              </a:spcBef>
+              <a:buFont typeface="Arial" panose="020B0604020202020204" pitchFamily="34" charset="0"/>
+              <a:buChar char="•"/>
+              <a:defRPr sz="1800" kern="1200">
+                <a:solidFill>
+                  <a:schemeClr val="tx1"/>
+                </a:solidFill>
+                <a:latin typeface="+mn-lt"/>
+                <a:ea typeface="+mn-ea"/>
+                <a:cs typeface="+mn-cs"/>
+              </a:defRPr>
+            </a:lvl9pPr>
+          </a:lstStyle>
+          <a:p>
+            <a:pPr marL="0" indent="0">
+              <a:spcBef>
+                <a:spcPts val="600"/>
+              </a:spcBef>
+              <a:buNone/>
+            </a:pPr>
+            <a:r>
+              <a:rPr lang="en-US" sz="1400" b="1" dirty="0">
+                <a:solidFill>
+                  <a:srgbClr val="3D3D4E"/>
+                </a:solidFill>
+                <a:latin typeface="Century Gothic" panose="020B0502020202020204" pitchFamily="34" charset="0"/>
+              </a:rPr>
+              <a:t>Replica Placement</a:t>
+            </a:r>
+          </a:p>
+          <a:p>
+            <a:pPr marL="0" indent="0">
+              <a:spcBef>
+                <a:spcPts val="600"/>
+              </a:spcBef>
+              <a:buNone/>
+            </a:pPr>
+            <a:r>
+              <a:rPr lang="en-US" sz="1000" b="0" i="0" dirty="0">
+                <a:solidFill>
+                  <a:srgbClr val="3D3D4E"/>
+                </a:solidFill>
+                <a:effectLst/>
+                <a:latin typeface="Century Gothic" panose="020B0502020202020204" pitchFamily="34" charset="0"/>
+              </a:rPr>
+              <a:t>Let’s understand the underlying challenge here.</a:t>
+            </a:r>
+          </a:p>
+          <a:p>
+            <a:pPr marL="0" indent="0">
+              <a:spcBef>
+                <a:spcPts val="600"/>
+              </a:spcBef>
+              <a:buNone/>
+            </a:pPr>
+            <a:r>
+              <a:rPr lang="en-US" sz="1000" b="1" dirty="0">
+                <a:solidFill>
+                  <a:srgbClr val="3D3D4E"/>
+                </a:solidFill>
+                <a:latin typeface="Century Gothic" panose="020B0502020202020204" pitchFamily="34" charset="0"/>
+              </a:rPr>
+              <a:t>What if Replica placement done within the Rack?</a:t>
+            </a:r>
+          </a:p>
+          <a:p>
+            <a:pPr marL="0" indent="0">
+              <a:spcBef>
+                <a:spcPts val="600"/>
+              </a:spcBef>
+              <a:buNone/>
+            </a:pPr>
+            <a:r>
+              <a:rPr lang="en-US" sz="1000" dirty="0">
+                <a:solidFill>
+                  <a:srgbClr val="3D3D4E"/>
+                </a:solidFill>
+                <a:latin typeface="Century Gothic" panose="020B0502020202020204" pitchFamily="34" charset="0"/>
+              </a:rPr>
+              <a:t>So, by this way, you will get advantage in less data travel while writing the data, and reading the data will have advantage of same rack  </a:t>
+            </a:r>
+          </a:p>
+          <a:p>
+            <a:pPr marL="0" indent="0">
+              <a:spcBef>
+                <a:spcPts val="600"/>
+              </a:spcBef>
+              <a:buNone/>
+            </a:pPr>
+            <a:r>
+              <a:rPr lang="en-US" sz="1000" b="0" i="0" dirty="0">
+                <a:solidFill>
+                  <a:srgbClr val="3D3D4E"/>
+                </a:solidFill>
+                <a:effectLst/>
+                <a:latin typeface="Century Gothic" panose="020B0502020202020204" pitchFamily="34" charset="0"/>
+              </a:rPr>
+              <a:t>But biggest disadvantage here is what if rack fails. In that case you open with system fault tolerant capability, which is great risk in distributed system where your client expect 100% fault tolerant system.</a:t>
+            </a:r>
+          </a:p>
+          <a:p>
+            <a:pPr marL="0" indent="0">
+              <a:spcBef>
+                <a:spcPts val="600"/>
+              </a:spcBef>
+              <a:buNone/>
+            </a:pPr>
+            <a:endParaRPr lang="en-US" sz="1000" dirty="0">
+              <a:solidFill>
+                <a:srgbClr val="3D3D4E"/>
+              </a:solidFill>
+              <a:latin typeface="Century Gothic" panose="020B0502020202020204" pitchFamily="34" charset="0"/>
+            </a:endParaRPr>
+          </a:p>
+          <a:p>
+            <a:pPr marL="0" indent="0">
+              <a:spcBef>
+                <a:spcPts val="600"/>
+              </a:spcBef>
+              <a:buNone/>
+            </a:pPr>
+            <a:r>
+              <a:rPr lang="en-US" sz="1000" dirty="0">
+                <a:solidFill>
+                  <a:srgbClr val="3D3D4E"/>
+                </a:solidFill>
+                <a:latin typeface="Century Gothic" panose="020B0502020202020204" pitchFamily="34" charset="0"/>
+              </a:rPr>
+              <a:t>That’s why Replica placement should be done in multiple rack.</a:t>
+            </a:r>
+          </a:p>
+          <a:p>
+            <a:pPr marL="0" indent="0">
+              <a:spcBef>
+                <a:spcPts val="600"/>
+              </a:spcBef>
+              <a:buNone/>
+            </a:pPr>
+            <a:r>
+              <a:rPr lang="en-US" sz="1000" dirty="0">
+                <a:solidFill>
+                  <a:srgbClr val="3D3D4E"/>
+                </a:solidFill>
+                <a:latin typeface="Century Gothic" panose="020B0502020202020204" pitchFamily="34" charset="0"/>
+              </a:rPr>
+              <a:t>But this approach also have some disadvantage, like writing of data is little slow than same rack. Also, data need to travel more, and it may impact your bandwidth usage but with all cost you are achieving super cool feature of </a:t>
+            </a:r>
+            <a:r>
+              <a:rPr lang="en-US" sz="1000" b="1" dirty="0">
+                <a:solidFill>
+                  <a:srgbClr val="3D3D4E"/>
+                </a:solidFill>
+                <a:latin typeface="Century Gothic" panose="020B0502020202020204" pitchFamily="34" charset="0"/>
+              </a:rPr>
+              <a:t>100% Fault Tolerant system tag</a:t>
+            </a:r>
+            <a:r>
+              <a:rPr lang="en-US" sz="1000" dirty="0">
+                <a:solidFill>
+                  <a:srgbClr val="3D3D4E"/>
+                </a:solidFill>
+                <a:latin typeface="Century Gothic" panose="020B0502020202020204" pitchFamily="34" charset="0"/>
+              </a:rPr>
+              <a:t>.</a:t>
+            </a:r>
+          </a:p>
+          <a:p>
+            <a:pPr marL="0" indent="0">
+              <a:spcBef>
+                <a:spcPts val="600"/>
+              </a:spcBef>
+              <a:buNone/>
+            </a:pPr>
+            <a:endParaRPr lang="en-US" sz="1000" b="0" i="0" dirty="0">
+              <a:solidFill>
+                <a:srgbClr val="3D3D4E"/>
+              </a:solidFill>
+              <a:effectLst/>
+              <a:latin typeface="Century Gothic" panose="020B0502020202020204" pitchFamily="34" charset="0"/>
+            </a:endParaRPr>
+          </a:p>
+          <a:p>
+            <a:pPr marL="0" indent="0">
+              <a:spcBef>
+                <a:spcPts val="600"/>
+              </a:spcBef>
+              <a:buNone/>
+            </a:pPr>
+            <a:r>
+              <a:rPr lang="en-US" sz="1000" b="1" i="0" dirty="0">
+                <a:solidFill>
+                  <a:srgbClr val="7030A0"/>
+                </a:solidFill>
+                <a:effectLst/>
+                <a:latin typeface="Century Gothic" panose="020B0502020202020204" pitchFamily="34" charset="0"/>
+              </a:rPr>
+              <a:t>And so, GFS decided to take 2</a:t>
+            </a:r>
+            <a:r>
+              <a:rPr lang="en-US" sz="1000" b="1" i="0" baseline="30000" dirty="0">
+                <a:solidFill>
+                  <a:srgbClr val="7030A0"/>
+                </a:solidFill>
+                <a:effectLst/>
+                <a:latin typeface="Century Gothic" panose="020B0502020202020204" pitchFamily="34" charset="0"/>
+              </a:rPr>
+              <a:t>nd</a:t>
+            </a:r>
+            <a:r>
+              <a:rPr lang="en-US" sz="1000" b="1" i="0" dirty="0">
+                <a:solidFill>
+                  <a:srgbClr val="7030A0"/>
+                </a:solidFill>
+                <a:effectLst/>
+                <a:latin typeface="Century Gothic" panose="020B0502020202020204" pitchFamily="34" charset="0"/>
+              </a:rPr>
+              <a:t> approach where they are placing replica in different Racks.</a:t>
+            </a:r>
+          </a:p>
+          <a:p>
+            <a:pPr marL="0" indent="0">
+              <a:spcBef>
+                <a:spcPts val="600"/>
+              </a:spcBef>
+              <a:buNone/>
+            </a:pPr>
+            <a:endParaRPr lang="en-US" sz="1000" b="0" i="0" dirty="0">
+              <a:solidFill>
+                <a:srgbClr val="3D3D4E"/>
+              </a:solidFill>
+              <a:effectLst/>
+              <a:latin typeface="Century Gothic" panose="020B0502020202020204" pitchFamily="34" charset="0"/>
+            </a:endParaRPr>
+          </a:p>
+          <a:p>
+            <a:pPr marL="0" indent="0">
+              <a:spcBef>
+                <a:spcPts val="600"/>
+              </a:spcBef>
+              <a:buNone/>
+            </a:pPr>
+            <a:r>
+              <a:rPr lang="en-US" sz="1400" b="1" i="0" dirty="0">
+                <a:solidFill>
+                  <a:srgbClr val="3D3D4E"/>
+                </a:solidFill>
+                <a:effectLst/>
+                <a:latin typeface="Century Gothic" panose="020B0502020202020204" pitchFamily="34" charset="0"/>
+              </a:rPr>
+              <a:t>Replica creation &amp; re-replication</a:t>
+            </a:r>
+          </a:p>
+          <a:p>
+            <a:pPr marL="0" indent="0">
+              <a:spcBef>
+                <a:spcPts val="600"/>
+              </a:spcBef>
+              <a:buNone/>
+            </a:pPr>
+            <a:r>
+              <a:rPr lang="en-US" sz="1000" dirty="0">
+                <a:latin typeface="Century Gothic" panose="020B0502020202020204" pitchFamily="34" charset="0"/>
+              </a:rPr>
+              <a:t>Let’s discuss the strategy of selection of ChunkServer.</a:t>
+            </a:r>
+          </a:p>
+          <a:p>
+            <a:pPr marL="0" indent="0">
+              <a:spcBef>
+                <a:spcPts val="600"/>
+              </a:spcBef>
+              <a:buNone/>
+            </a:pPr>
+            <a:r>
+              <a:rPr lang="en-US" sz="1000" dirty="0">
+                <a:latin typeface="Century Gothic" panose="020B0502020202020204" pitchFamily="34" charset="0"/>
+              </a:rPr>
+              <a:t>The goals of a master are to place replicas on servers with</a:t>
+            </a:r>
+          </a:p>
+          <a:p>
+            <a:pPr>
+              <a:spcBef>
+                <a:spcPts val="600"/>
+              </a:spcBef>
+              <a:buFont typeface="Wingdings" panose="05000000000000000000" pitchFamily="2" charset="2"/>
+              <a:buChar char="ü"/>
+            </a:pPr>
+            <a:r>
+              <a:rPr lang="en-US" sz="1000" dirty="0">
+                <a:latin typeface="Century Gothic" panose="020B0502020202020204" pitchFamily="34" charset="0"/>
+              </a:rPr>
+              <a:t>less-than-average disk utilization</a:t>
+            </a:r>
+          </a:p>
+          <a:p>
+            <a:pPr>
+              <a:spcBef>
+                <a:spcPts val="600"/>
+              </a:spcBef>
+              <a:buFont typeface="Wingdings" panose="05000000000000000000" pitchFamily="2" charset="2"/>
+              <a:buChar char="ü"/>
+            </a:pPr>
+            <a:r>
+              <a:rPr lang="en-US" sz="1000" dirty="0">
+                <a:latin typeface="Century Gothic" panose="020B0502020202020204" pitchFamily="34" charset="0"/>
+              </a:rPr>
+              <a:t> spread replicas across racks</a:t>
+            </a:r>
+          </a:p>
+          <a:p>
+            <a:pPr>
+              <a:spcBef>
+                <a:spcPts val="600"/>
+              </a:spcBef>
+              <a:buFont typeface="Wingdings" panose="05000000000000000000" pitchFamily="2" charset="2"/>
+              <a:buChar char="ü"/>
+            </a:pPr>
+            <a:r>
+              <a:rPr lang="en-US" sz="1000" dirty="0">
+                <a:latin typeface="Century Gothic" panose="020B0502020202020204" pitchFamily="34" charset="0"/>
+              </a:rPr>
+              <a:t>reduce the number of ‘recent’ creations on each ChunkServer (in simple term prefer new server over last used server if condition is same for both)</a:t>
+            </a:r>
+          </a:p>
+          <a:p>
+            <a:pPr>
+              <a:spcBef>
+                <a:spcPts val="600"/>
+              </a:spcBef>
+              <a:buFont typeface="Wingdings" panose="05000000000000000000" pitchFamily="2" charset="2"/>
+              <a:buChar char="ü"/>
+            </a:pPr>
+            <a:r>
+              <a:rPr lang="en-US" sz="1000" dirty="0">
+                <a:latin typeface="Century Gothic" panose="020B0502020202020204" pitchFamily="34" charset="0"/>
+              </a:rPr>
+              <a:t>Make sure the replica factor count maintained for Chunk at all the possible time</a:t>
+            </a:r>
+          </a:p>
+          <a:p>
+            <a:pPr>
+              <a:spcBef>
+                <a:spcPts val="600"/>
+              </a:spcBef>
+              <a:buFont typeface="Wingdings" panose="05000000000000000000" pitchFamily="2" charset="2"/>
+              <a:buChar char="ü"/>
+            </a:pPr>
+            <a:r>
+              <a:rPr lang="en-US" sz="1000" dirty="0">
+                <a:latin typeface="Century Gothic" panose="020B0502020202020204" pitchFamily="34" charset="0"/>
+              </a:rPr>
+              <a:t>Re-replication priorities or managed from master in such a way that it must not create bottleneck into the system</a:t>
+            </a:r>
+          </a:p>
+          <a:p>
+            <a:pPr>
+              <a:spcBef>
+                <a:spcPts val="600"/>
+              </a:spcBef>
+              <a:buFont typeface="Wingdings" panose="05000000000000000000" pitchFamily="2" charset="2"/>
+              <a:buChar char="ü"/>
+            </a:pPr>
+            <a:r>
+              <a:rPr lang="en-US" sz="1000" dirty="0">
+                <a:latin typeface="Century Gothic" panose="020B0502020202020204" pitchFamily="34" charset="0"/>
+              </a:rPr>
+              <a:t>Another smart strategy placed here is to put bandwidth restriction over ChunkServer, to manage some rationality in usage of system</a:t>
+            </a:r>
+          </a:p>
+          <a:p>
+            <a:pPr marL="0" indent="0">
+              <a:spcBef>
+                <a:spcPts val="600"/>
+              </a:spcBef>
+              <a:buNone/>
+            </a:pPr>
+            <a:endParaRPr lang="en-US" sz="1000" dirty="0">
+              <a:latin typeface="Century Gothic" panose="020B0502020202020204" pitchFamily="34" charset="0"/>
+            </a:endParaRPr>
+          </a:p>
+          <a:p>
+            <a:pPr marL="0" indent="0">
+              <a:spcBef>
+                <a:spcPts val="600"/>
+              </a:spcBef>
+              <a:buNone/>
+            </a:pPr>
+            <a:endParaRPr lang="en-US" sz="1000" dirty="0">
+              <a:solidFill>
+                <a:srgbClr val="3D3D4E"/>
+              </a:solidFill>
+              <a:latin typeface="Century Gothic" panose="020B0502020202020204" pitchFamily="34" charset="0"/>
+            </a:endParaRPr>
+          </a:p>
+          <a:p>
+            <a:pPr marL="0" indent="0">
+              <a:spcBef>
+                <a:spcPts val="0"/>
+              </a:spcBef>
+              <a:buNone/>
+            </a:pPr>
+            <a:endParaRPr lang="en-US" sz="1000" b="0" i="0" dirty="0">
+              <a:solidFill>
+                <a:srgbClr val="3D3D4E"/>
+              </a:solidFill>
+              <a:effectLst/>
+              <a:latin typeface="Century Gothic" panose="020B0502020202020204" pitchFamily="34" charset="0"/>
+            </a:endParaRPr>
+          </a:p>
+          <a:p>
+            <a:pPr marL="0" indent="0">
+              <a:spcBef>
+                <a:spcPts val="0"/>
+              </a:spcBef>
+              <a:buNone/>
+            </a:pPr>
+            <a:endParaRPr lang="en-US" sz="1000" dirty="0">
+              <a:solidFill>
+                <a:srgbClr val="3D3D4E"/>
+              </a:solidFill>
+              <a:latin typeface="Century Gothic" panose="020B0502020202020204" pitchFamily="34" charset="0"/>
+            </a:endParaRPr>
+          </a:p>
+          <a:p>
+            <a:pPr marL="0" indent="0">
+              <a:spcBef>
+                <a:spcPts val="0"/>
+              </a:spcBef>
+              <a:buNone/>
+            </a:pPr>
+            <a:endParaRPr lang="en-US" sz="1000" b="0" i="0" dirty="0">
+              <a:solidFill>
+                <a:srgbClr val="3D3D4E"/>
+              </a:solidFill>
+              <a:effectLst/>
+              <a:latin typeface="Century Gothic" panose="020B0502020202020204" pitchFamily="34" charset="0"/>
+            </a:endParaRPr>
+          </a:p>
+          <a:p>
+            <a:pPr marL="0" indent="0">
+              <a:spcBef>
+                <a:spcPts val="0"/>
+              </a:spcBef>
+              <a:buNone/>
+            </a:pPr>
+            <a:endParaRPr lang="en-US" sz="1000" dirty="0">
+              <a:solidFill>
+                <a:srgbClr val="3D3D4E"/>
+              </a:solidFill>
+              <a:latin typeface="Century Gothic" panose="020B0502020202020204" pitchFamily="34" charset="0"/>
+            </a:endParaRPr>
+          </a:p>
+          <a:p>
+            <a:pPr marL="0" indent="0">
+              <a:spcBef>
+                <a:spcPts val="0"/>
+              </a:spcBef>
+              <a:buNone/>
+            </a:pPr>
+            <a:endParaRPr lang="en-US" sz="1000" b="0" i="0" dirty="0">
+              <a:solidFill>
+                <a:srgbClr val="3D3D4E"/>
+              </a:solidFill>
+              <a:effectLst/>
+              <a:latin typeface="Century Gothic" panose="020B0502020202020204" pitchFamily="34" charset="0"/>
+            </a:endParaRPr>
+          </a:p>
+          <a:p>
+            <a:pPr marL="0" indent="0">
+              <a:spcBef>
+                <a:spcPts val="0"/>
+              </a:spcBef>
+              <a:buNone/>
+            </a:pPr>
+            <a:endParaRPr lang="en-US" sz="1000" b="0" i="0" dirty="0">
+              <a:solidFill>
+                <a:srgbClr val="3D3D4E"/>
+              </a:solidFill>
+              <a:effectLst/>
+              <a:latin typeface="Century Gothic" panose="020B0502020202020204" pitchFamily="34" charset="0"/>
+            </a:endParaRPr>
+          </a:p>
+          <a:p>
+            <a:pPr marL="0" indent="0">
+              <a:spcBef>
+                <a:spcPts val="0"/>
+              </a:spcBef>
+              <a:buNone/>
+            </a:pPr>
+            <a:endParaRPr lang="en-US" sz="1000" dirty="0">
+              <a:solidFill>
+                <a:srgbClr val="3D3D4E"/>
+              </a:solidFill>
+              <a:latin typeface="Century Gothic" panose="020B0502020202020204" pitchFamily="34" charset="0"/>
+            </a:endParaRPr>
+          </a:p>
+          <a:p>
+            <a:pPr marL="0" indent="0">
+              <a:spcBef>
+                <a:spcPts val="0"/>
+              </a:spcBef>
+              <a:buNone/>
+            </a:pPr>
+            <a:endParaRPr lang="en-US" sz="1000" b="0" i="0" dirty="0">
+              <a:solidFill>
+                <a:srgbClr val="3D3D4E"/>
+              </a:solidFill>
+              <a:effectLst/>
+              <a:latin typeface="Century Gothic" panose="020B0502020202020204" pitchFamily="34" charset="0"/>
+            </a:endParaRPr>
+          </a:p>
+          <a:p>
+            <a:pPr marL="0" indent="0">
+              <a:spcBef>
+                <a:spcPts val="0"/>
+              </a:spcBef>
+              <a:buNone/>
+            </a:pPr>
+            <a:endParaRPr lang="en-US" sz="1000" dirty="0">
+              <a:solidFill>
+                <a:srgbClr val="3D3D4E"/>
+              </a:solidFill>
+              <a:latin typeface="Century Gothic" panose="020B0502020202020204" pitchFamily="34" charset="0"/>
+            </a:endParaRPr>
+          </a:p>
+          <a:p>
+            <a:pPr marL="0" indent="0">
+              <a:spcBef>
+                <a:spcPts val="0"/>
+              </a:spcBef>
+              <a:buNone/>
+            </a:pPr>
+            <a:endParaRPr lang="en-US" sz="1000" b="0" i="0" dirty="0">
+              <a:solidFill>
+                <a:srgbClr val="3D3D4E"/>
+              </a:solidFill>
+              <a:effectLst/>
+              <a:latin typeface="Century Gothic" panose="020B0502020202020204" pitchFamily="34" charset="0"/>
+            </a:endParaRPr>
+          </a:p>
+          <a:p>
+            <a:pPr marL="0" indent="0">
+              <a:spcBef>
+                <a:spcPts val="0"/>
+              </a:spcBef>
+              <a:buNone/>
+            </a:pPr>
+            <a:endParaRPr lang="en-US" sz="1000" dirty="0">
+              <a:solidFill>
+                <a:srgbClr val="3D3D4E"/>
+              </a:solidFill>
+              <a:latin typeface="Century Gothic" panose="020B0502020202020204" pitchFamily="34" charset="0"/>
+            </a:endParaRPr>
+          </a:p>
+          <a:p>
+            <a:pPr marL="0" indent="0">
+              <a:spcBef>
+                <a:spcPts val="0"/>
+              </a:spcBef>
+              <a:buNone/>
+            </a:pPr>
+            <a:endParaRPr lang="en-US" sz="1000" b="0" i="0" dirty="0">
+              <a:solidFill>
+                <a:srgbClr val="3D3D4E"/>
+              </a:solidFill>
+              <a:effectLst/>
+              <a:latin typeface="Century Gothic" panose="020B0502020202020204" pitchFamily="34" charset="0"/>
+            </a:endParaRPr>
+          </a:p>
+          <a:p>
+            <a:pPr marL="0" indent="0">
+              <a:spcBef>
+                <a:spcPts val="0"/>
+              </a:spcBef>
+              <a:buNone/>
+            </a:pPr>
+            <a:endParaRPr lang="en-US" sz="1000" dirty="0">
+              <a:solidFill>
+                <a:srgbClr val="3D3D4E"/>
+              </a:solidFill>
+              <a:latin typeface="Century Gothic" panose="020B0502020202020204" pitchFamily="34" charset="0"/>
+            </a:endParaRPr>
+          </a:p>
+          <a:p>
+            <a:pPr marL="0" indent="0">
+              <a:spcBef>
+                <a:spcPts val="0"/>
+              </a:spcBef>
+              <a:buFont typeface="Arial" panose="020B0604020202020204" pitchFamily="34" charset="0"/>
+              <a:buNone/>
+            </a:pPr>
+            <a:endParaRPr lang="en-US" sz="1200" dirty="0">
+              <a:solidFill>
+                <a:srgbClr val="3D3D4E"/>
+              </a:solidFill>
+              <a:latin typeface="Century Gothic" panose="020B0502020202020204" pitchFamily="34" charset="0"/>
+            </a:endParaRPr>
+          </a:p>
+          <a:p>
+            <a:pPr marL="0" indent="0">
+              <a:spcBef>
+                <a:spcPts val="0"/>
+              </a:spcBef>
+              <a:buFont typeface="Arial" panose="020B0604020202020204" pitchFamily="34" charset="0"/>
+              <a:buNone/>
+            </a:pPr>
+            <a:endParaRPr lang="en-US" sz="1200" dirty="0">
+              <a:solidFill>
+                <a:srgbClr val="3D3D4E"/>
+              </a:solidFill>
+              <a:latin typeface="Century Gothic" panose="020B0502020202020204" pitchFamily="34" charset="0"/>
+            </a:endParaRPr>
+          </a:p>
+          <a:p>
+            <a:pPr marL="0" indent="0">
+              <a:buFont typeface="Arial" panose="020B0604020202020204" pitchFamily="34" charset="0"/>
+              <a:buNone/>
+            </a:pPr>
+            <a:endParaRPr lang="en-US" sz="1200" b="1" dirty="0">
+              <a:solidFill>
+                <a:srgbClr val="3D3D4E"/>
+              </a:solidFill>
+              <a:latin typeface="Century Gothic" panose="020B0502020202020204" pitchFamily="34" charset="0"/>
+            </a:endParaRPr>
+          </a:p>
+          <a:p>
+            <a:pPr marL="0" indent="0">
+              <a:buFont typeface="Arial" panose="020B0604020202020204" pitchFamily="34" charset="0"/>
+              <a:buNone/>
+            </a:pPr>
+            <a:endParaRPr lang="en-US" sz="1200" b="1" dirty="0">
+              <a:solidFill>
+                <a:srgbClr val="3D3D4E"/>
+              </a:solidFill>
+              <a:latin typeface="Century Gothic" panose="020B0502020202020204" pitchFamily="34" charset="0"/>
+            </a:endParaRPr>
+          </a:p>
+          <a:p>
+            <a:pPr marL="0" indent="0">
+              <a:buFont typeface="Arial" panose="020B0604020202020204" pitchFamily="34" charset="0"/>
+              <a:buNone/>
+            </a:pPr>
+            <a:endParaRPr lang="en-US" sz="1200" b="1" dirty="0">
+              <a:solidFill>
+                <a:srgbClr val="3D3D4E"/>
+              </a:solidFill>
+              <a:latin typeface="Century Gothic" panose="020B0502020202020204" pitchFamily="34" charset="0"/>
+            </a:endParaRPr>
+          </a:p>
+          <a:p>
+            <a:pPr marL="0" indent="0">
+              <a:buFont typeface="Arial" panose="020B0604020202020204" pitchFamily="34" charset="0"/>
+              <a:buNone/>
+            </a:pPr>
+            <a:endParaRPr lang="en-IN" sz="1200" b="1" dirty="0">
+              <a:solidFill>
+                <a:srgbClr val="3D3D4E"/>
+              </a:solidFill>
+              <a:latin typeface="Century Gothic" panose="020B0502020202020204" pitchFamily="34" charset="0"/>
+            </a:endParaRPr>
+          </a:p>
+          <a:p>
+            <a:pPr marL="0" indent="0">
+              <a:spcBef>
+                <a:spcPts val="0"/>
+              </a:spcBef>
+              <a:buFont typeface="Arial" panose="020B0604020202020204" pitchFamily="34" charset="0"/>
+              <a:buNone/>
+            </a:pPr>
+            <a:endParaRPr lang="en-IN" sz="1200" dirty="0">
+              <a:solidFill>
+                <a:srgbClr val="3D3D4E"/>
+              </a:solidFill>
+              <a:latin typeface="Century Gothic" panose="020B0502020202020204" pitchFamily="34" charset="0"/>
+            </a:endParaRPr>
+          </a:p>
+          <a:p>
+            <a:pPr marL="0" indent="0">
+              <a:spcBef>
+                <a:spcPts val="0"/>
+              </a:spcBef>
+              <a:buFont typeface="Arial" panose="020B0604020202020204" pitchFamily="34" charset="0"/>
+              <a:buNone/>
+            </a:pPr>
+            <a:endParaRPr lang="en-IN" sz="1200" dirty="0">
+              <a:solidFill>
+                <a:srgbClr val="3D3D4E"/>
+              </a:solidFill>
+              <a:latin typeface="Century Gothic" panose="020B0502020202020204" pitchFamily="34" charset="0"/>
+            </a:endParaRPr>
+          </a:p>
+          <a:p>
+            <a:pPr marL="0" indent="0">
+              <a:buFont typeface="Arial" panose="020B0604020202020204" pitchFamily="34" charset="0"/>
+              <a:buNone/>
+            </a:pPr>
+            <a:endParaRPr lang="en-IN" sz="1200" dirty="0">
+              <a:solidFill>
+                <a:srgbClr val="3D3D4E"/>
+              </a:solidFill>
+              <a:latin typeface="Century Gothic" panose="020B0502020202020204" pitchFamily="34" charset="0"/>
+            </a:endParaRPr>
+          </a:p>
+          <a:p>
+            <a:pPr marL="0" indent="0">
+              <a:buFont typeface="Arial" panose="020B0604020202020204" pitchFamily="34" charset="0"/>
+              <a:buNone/>
+            </a:pPr>
+            <a:endParaRPr lang="en-IN" sz="1200" dirty="0">
+              <a:solidFill>
+                <a:srgbClr val="3D3D4E"/>
+              </a:solidFill>
+              <a:latin typeface="Century Gothic" panose="020B0502020202020204" pitchFamily="34" charset="0"/>
+            </a:endParaRPr>
+          </a:p>
+          <a:p>
+            <a:pPr marL="0" indent="0">
+              <a:buFont typeface="Arial" panose="020B0604020202020204" pitchFamily="34" charset="0"/>
+              <a:buNone/>
+            </a:pPr>
+            <a:endParaRPr lang="en-IN" sz="1200" dirty="0">
+              <a:solidFill>
+                <a:srgbClr val="3D3D4E"/>
+              </a:solidFill>
+              <a:latin typeface="Century Gothic" panose="020B0502020202020204" pitchFamily="34" charset="0"/>
+            </a:endParaRPr>
+          </a:p>
+          <a:p>
+            <a:pPr marL="0" indent="0">
+              <a:buFont typeface="Arial" panose="020B0604020202020204" pitchFamily="34" charset="0"/>
+              <a:buNone/>
+            </a:pPr>
+            <a:endParaRPr lang="en-IN" sz="1200" dirty="0">
+              <a:solidFill>
+                <a:srgbClr val="3D3D4E"/>
+              </a:solidFill>
+              <a:latin typeface="Century Gothic" panose="020B0502020202020204" pitchFamily="34" charset="0"/>
+            </a:endParaRPr>
+          </a:p>
+          <a:p>
+            <a:pPr marL="0" indent="0">
+              <a:buFont typeface="Arial" panose="020B0604020202020204" pitchFamily="34" charset="0"/>
+              <a:buNone/>
+            </a:pPr>
+            <a:endParaRPr lang="en-IN" sz="1200" dirty="0">
+              <a:solidFill>
+                <a:srgbClr val="3D3D4E"/>
+              </a:solidFill>
+              <a:latin typeface="Century Gothic" panose="020B0502020202020204" pitchFamily="34" charset="0"/>
+            </a:endParaRPr>
           </a:p>
         </p:txBody>
       </p:sp>

</xml_diff>